<commit_message>
Clean up splash screen
</commit_message>
<xml_diff>
--- a/pymdwizard/resources/icons/SplashScreenGeneration.pptx
+++ b/pymdwizard/resources/icons/SplashScreenGeneration.pptx
@@ -104,6 +104,11 @@
       </a:defRPr>
     </a:lvl9pPr>
   </p:defaultTextStyle>
+  <p:extLst>
+    <p:ext uri="{EFAFB233-063F-42B5-8137-9DF3F51BA10A}">
+      <p15:sldGuideLst xmlns:p15="http://schemas.microsoft.com/office/powerpoint/2012/main"/>
+    </p:ext>
+  </p:extLst>
 </p:presentation>
 </file>
 
@@ -238,7 +243,7 @@
           <a:p>
             <a:fld id="{7ECA231E-A98D-4CFD-BF7B-F211F4ADBCDA}" type="datetimeFigureOut">
               <a:rPr lang="en-US" smtClean="0"/>
-              <a:t>4/28/2017</a:t>
+              <a:t>5/4/2017</a:t>
             </a:fld>
             <a:endParaRPr lang="en-US"/>
           </a:p>
@@ -408,7 +413,7 @@
           <a:p>
             <a:fld id="{7ECA231E-A98D-4CFD-BF7B-F211F4ADBCDA}" type="datetimeFigureOut">
               <a:rPr lang="en-US" smtClean="0"/>
-              <a:t>4/28/2017</a:t>
+              <a:t>5/4/2017</a:t>
             </a:fld>
             <a:endParaRPr lang="en-US"/>
           </a:p>
@@ -588,7 +593,7 @@
           <a:p>
             <a:fld id="{7ECA231E-A98D-4CFD-BF7B-F211F4ADBCDA}" type="datetimeFigureOut">
               <a:rPr lang="en-US" smtClean="0"/>
-              <a:t>4/28/2017</a:t>
+              <a:t>5/4/2017</a:t>
             </a:fld>
             <a:endParaRPr lang="en-US"/>
           </a:p>
@@ -758,7 +763,7 @@
           <a:p>
             <a:fld id="{7ECA231E-A98D-4CFD-BF7B-F211F4ADBCDA}" type="datetimeFigureOut">
               <a:rPr lang="en-US" smtClean="0"/>
-              <a:t>4/28/2017</a:t>
+              <a:t>5/4/2017</a:t>
             </a:fld>
             <a:endParaRPr lang="en-US"/>
           </a:p>
@@ -1004,7 +1009,7 @@
           <a:p>
             <a:fld id="{7ECA231E-A98D-4CFD-BF7B-F211F4ADBCDA}" type="datetimeFigureOut">
               <a:rPr lang="en-US" smtClean="0"/>
-              <a:t>4/28/2017</a:t>
+              <a:t>5/4/2017</a:t>
             </a:fld>
             <a:endParaRPr lang="en-US"/>
           </a:p>
@@ -1236,7 +1241,7 @@
           <a:p>
             <a:fld id="{7ECA231E-A98D-4CFD-BF7B-F211F4ADBCDA}" type="datetimeFigureOut">
               <a:rPr lang="en-US" smtClean="0"/>
-              <a:t>4/28/2017</a:t>
+              <a:t>5/4/2017</a:t>
             </a:fld>
             <a:endParaRPr lang="en-US"/>
           </a:p>
@@ -1603,7 +1608,7 @@
           <a:p>
             <a:fld id="{7ECA231E-A98D-4CFD-BF7B-F211F4ADBCDA}" type="datetimeFigureOut">
               <a:rPr lang="en-US" smtClean="0"/>
-              <a:t>4/28/2017</a:t>
+              <a:t>5/4/2017</a:t>
             </a:fld>
             <a:endParaRPr lang="en-US"/>
           </a:p>
@@ -1721,7 +1726,7 @@
           <a:p>
             <a:fld id="{7ECA231E-A98D-4CFD-BF7B-F211F4ADBCDA}" type="datetimeFigureOut">
               <a:rPr lang="en-US" smtClean="0"/>
-              <a:t>4/28/2017</a:t>
+              <a:t>5/4/2017</a:t>
             </a:fld>
             <a:endParaRPr lang="en-US"/>
           </a:p>
@@ -1816,7 +1821,7 @@
           <a:p>
             <a:fld id="{7ECA231E-A98D-4CFD-BF7B-F211F4ADBCDA}" type="datetimeFigureOut">
               <a:rPr lang="en-US" smtClean="0"/>
-              <a:t>4/28/2017</a:t>
+              <a:t>5/4/2017</a:t>
             </a:fld>
             <a:endParaRPr lang="en-US"/>
           </a:p>
@@ -2093,7 +2098,7 @@
           <a:p>
             <a:fld id="{7ECA231E-A98D-4CFD-BF7B-F211F4ADBCDA}" type="datetimeFigureOut">
               <a:rPr lang="en-US" smtClean="0"/>
-              <a:t>4/28/2017</a:t>
+              <a:t>5/4/2017</a:t>
             </a:fld>
             <a:endParaRPr lang="en-US"/>
           </a:p>
@@ -2346,7 +2351,7 @@
           <a:p>
             <a:fld id="{7ECA231E-A98D-4CFD-BF7B-F211F4ADBCDA}" type="datetimeFigureOut">
               <a:rPr lang="en-US" smtClean="0"/>
-              <a:t>4/28/2017</a:t>
+              <a:t>5/4/2017</a:t>
             </a:fld>
             <a:endParaRPr lang="en-US"/>
           </a:p>
@@ -2559,7 +2564,7 @@
           <a:p>
             <a:fld id="{7ECA231E-A98D-4CFD-BF7B-F211F4ADBCDA}" type="datetimeFigureOut">
               <a:rPr lang="en-US" smtClean="0"/>
-              <a:t>4/28/2017</a:t>
+              <a:t>5/4/2017</a:t>
             </a:fld>
             <a:endParaRPr lang="en-US"/>
           </a:p>
@@ -3061,7 +3066,7 @@
         </p:nvSpPr>
         <p:spPr>
           <a:xfrm>
-            <a:off x="7259889" y="1762515"/>
+            <a:off x="7168449" y="1762515"/>
             <a:ext cx="3240470" cy="584775"/>
           </a:xfrm>
           <a:prstGeom prst="rect">
@@ -3075,7 +3080,7 @@
           </a:bodyPr>
           <a:lstStyle/>
           <a:p>
-            <a:pPr algn="ctr"/>
+            <a:pPr algn="r"/>
             <a:r>
               <a:rPr lang="en-US" sz="3200" dirty="0" smtClean="0">
                 <a:solidFill>
@@ -3092,7 +3097,7 @@
                 </a:effectLst>
                 <a:latin typeface="Arial Black" panose="020B0A04020102020204" pitchFamily="34" charset="0"/>
               </a:rPr>
-              <a:t>0.0.1 (alpha)</a:t>
+              <a:t>0.0.1</a:t>
             </a:r>
             <a:endParaRPr lang="en-US" sz="3200" dirty="0">
               <a:solidFill>
@@ -3199,6 +3204,145 @@
           </a:extLst>
         </p:spPr>
       </p:pic>
+      <p:sp>
+        <p:nvSpPr>
+          <p:cNvPr id="8" name="Diagonal Stripe 7"/>
+          <p:cNvSpPr/>
+          <p:nvPr/>
+        </p:nvSpPr>
+        <p:spPr>
+          <a:xfrm>
+            <a:off x="717232" y="480060"/>
+            <a:ext cx="4346526" cy="3472502"/>
+          </a:xfrm>
+          <a:prstGeom prst="diagStripe">
+            <a:avLst>
+              <a:gd name="adj" fmla="val 69780"/>
+            </a:avLst>
+          </a:prstGeom>
+          <a:solidFill>
+            <a:schemeClr val="bg1">
+              <a:lumMod val="95000"/>
+              <a:alpha val="73000"/>
+            </a:schemeClr>
+          </a:solidFill>
+          <a:ln>
+            <a:noFill/>
+          </a:ln>
+        </p:spPr>
+        <p:style>
+          <a:lnRef idx="2">
+            <a:schemeClr val="accent1">
+              <a:shade val="50000"/>
+            </a:schemeClr>
+          </a:lnRef>
+          <a:fillRef idx="1">
+            <a:schemeClr val="accent1"/>
+          </a:fillRef>
+          <a:effectRef idx="0">
+            <a:schemeClr val="accent1"/>
+          </a:effectRef>
+          <a:fontRef idx="minor">
+            <a:schemeClr val="lt1"/>
+          </a:fontRef>
+        </p:style>
+        <p:txBody>
+          <a:bodyPr rtlCol="0" anchor="ctr"/>
+          <a:lstStyle/>
+          <a:p>
+            <a:pPr algn="ctr"/>
+            <a:endParaRPr lang="en-US" dirty="0">
+              <a:solidFill>
+                <a:schemeClr val="tx1"/>
+              </a:solidFill>
+            </a:endParaRPr>
+          </a:p>
+        </p:txBody>
+      </p:sp>
+      <p:sp>
+        <p:nvSpPr>
+          <p:cNvPr id="2" name="TextBox 1"/>
+          <p:cNvSpPr txBox="1"/>
+          <p:nvPr/>
+        </p:nvSpPr>
+        <p:spPr>
+          <a:xfrm rot="19254694">
+            <a:off x="560525" y="1706827"/>
+            <a:ext cx="3839108" cy="646331"/>
+          </a:xfrm>
+          <a:prstGeom prst="rect">
+            <a:avLst/>
+          </a:prstGeom>
+          <a:noFill/>
+        </p:spPr>
+        <p:txBody>
+          <a:bodyPr wrap="square" rtlCol="0">
+            <a:spAutoFit/>
+          </a:bodyPr>
+          <a:lstStyle/>
+          <a:p>
+            <a:pPr algn="ctr"/>
+            <a:r>
+              <a:rPr lang="en-US" sz="3600" dirty="0" smtClean="0">
+                <a:latin typeface="Arial Black" panose="020B0A04020102020204" pitchFamily="34" charset="0"/>
+              </a:rPr>
+              <a:t>Alpha Release </a:t>
+            </a:r>
+            <a:endParaRPr lang="en-US" sz="3600" dirty="0">
+              <a:latin typeface="Arial Black" panose="020B0A04020102020204" pitchFamily="34" charset="0"/>
+            </a:endParaRPr>
+          </a:p>
+        </p:txBody>
+      </p:sp>
+      <p:sp>
+        <p:nvSpPr>
+          <p:cNvPr id="3" name="Rectangle 2"/>
+          <p:cNvSpPr/>
+          <p:nvPr/>
+        </p:nvSpPr>
+        <p:spPr>
+          <a:xfrm>
+            <a:off x="706161" y="480060"/>
+            <a:ext cx="10692405" cy="5867400"/>
+          </a:xfrm>
+          <a:prstGeom prst="rect">
+            <a:avLst/>
+          </a:prstGeom>
+          <a:noFill/>
+          <a:ln>
+            <a:solidFill>
+              <a:schemeClr val="tx1">
+                <a:lumMod val="85000"/>
+                <a:lumOff val="15000"/>
+              </a:schemeClr>
+            </a:solidFill>
+          </a:ln>
+        </p:spPr>
+        <p:style>
+          <a:lnRef idx="2">
+            <a:schemeClr val="accent1">
+              <a:shade val="50000"/>
+            </a:schemeClr>
+          </a:lnRef>
+          <a:fillRef idx="1">
+            <a:schemeClr val="accent1"/>
+          </a:fillRef>
+          <a:effectRef idx="0">
+            <a:schemeClr val="accent1"/>
+          </a:effectRef>
+          <a:fontRef idx="minor">
+            <a:schemeClr val="lt1"/>
+          </a:fontRef>
+        </p:style>
+        <p:txBody>
+          <a:bodyPr rtlCol="0" anchor="ctr"/>
+          <a:lstStyle/>
+          <a:p>
+            <a:pPr algn="ctr"/>
+            <a:endParaRPr lang="en-US"/>
+          </a:p>
+        </p:txBody>
+      </p:sp>
     </p:spTree>
     <p:extLst>
       <p:ext uri="{BB962C8B-B14F-4D97-AF65-F5344CB8AC3E}">

</xml_diff>

<commit_message>
increment version number on splash screen
</commit_message>
<xml_diff>
--- a/pymdwizard/resources/icons/SplashScreenGeneration.pptx
+++ b/pymdwizard/resources/icons/SplashScreenGeneration.pptx
@@ -243,7 +243,7 @@
           <a:p>
             <a:fld id="{7ECA231E-A98D-4CFD-BF7B-F211F4ADBCDA}" type="datetimeFigureOut">
               <a:rPr lang="en-US" smtClean="0"/>
-              <a:t>5/4/2017</a:t>
+              <a:t>6/2/2017</a:t>
             </a:fld>
             <a:endParaRPr lang="en-US"/>
           </a:p>
@@ -413,7 +413,7 @@
           <a:p>
             <a:fld id="{7ECA231E-A98D-4CFD-BF7B-F211F4ADBCDA}" type="datetimeFigureOut">
               <a:rPr lang="en-US" smtClean="0"/>
-              <a:t>5/4/2017</a:t>
+              <a:t>6/2/2017</a:t>
             </a:fld>
             <a:endParaRPr lang="en-US"/>
           </a:p>
@@ -593,7 +593,7 @@
           <a:p>
             <a:fld id="{7ECA231E-A98D-4CFD-BF7B-F211F4ADBCDA}" type="datetimeFigureOut">
               <a:rPr lang="en-US" smtClean="0"/>
-              <a:t>5/4/2017</a:t>
+              <a:t>6/2/2017</a:t>
             </a:fld>
             <a:endParaRPr lang="en-US"/>
           </a:p>
@@ -763,7 +763,7 @@
           <a:p>
             <a:fld id="{7ECA231E-A98D-4CFD-BF7B-F211F4ADBCDA}" type="datetimeFigureOut">
               <a:rPr lang="en-US" smtClean="0"/>
-              <a:t>5/4/2017</a:t>
+              <a:t>6/2/2017</a:t>
             </a:fld>
             <a:endParaRPr lang="en-US"/>
           </a:p>
@@ -1009,7 +1009,7 @@
           <a:p>
             <a:fld id="{7ECA231E-A98D-4CFD-BF7B-F211F4ADBCDA}" type="datetimeFigureOut">
               <a:rPr lang="en-US" smtClean="0"/>
-              <a:t>5/4/2017</a:t>
+              <a:t>6/2/2017</a:t>
             </a:fld>
             <a:endParaRPr lang="en-US"/>
           </a:p>
@@ -1241,7 +1241,7 @@
           <a:p>
             <a:fld id="{7ECA231E-A98D-4CFD-BF7B-F211F4ADBCDA}" type="datetimeFigureOut">
               <a:rPr lang="en-US" smtClean="0"/>
-              <a:t>5/4/2017</a:t>
+              <a:t>6/2/2017</a:t>
             </a:fld>
             <a:endParaRPr lang="en-US"/>
           </a:p>
@@ -1608,7 +1608,7 @@
           <a:p>
             <a:fld id="{7ECA231E-A98D-4CFD-BF7B-F211F4ADBCDA}" type="datetimeFigureOut">
               <a:rPr lang="en-US" smtClean="0"/>
-              <a:t>5/4/2017</a:t>
+              <a:t>6/2/2017</a:t>
             </a:fld>
             <a:endParaRPr lang="en-US"/>
           </a:p>
@@ -1726,7 +1726,7 @@
           <a:p>
             <a:fld id="{7ECA231E-A98D-4CFD-BF7B-F211F4ADBCDA}" type="datetimeFigureOut">
               <a:rPr lang="en-US" smtClean="0"/>
-              <a:t>5/4/2017</a:t>
+              <a:t>6/2/2017</a:t>
             </a:fld>
             <a:endParaRPr lang="en-US"/>
           </a:p>
@@ -1821,7 +1821,7 @@
           <a:p>
             <a:fld id="{7ECA231E-A98D-4CFD-BF7B-F211F4ADBCDA}" type="datetimeFigureOut">
               <a:rPr lang="en-US" smtClean="0"/>
-              <a:t>5/4/2017</a:t>
+              <a:t>6/2/2017</a:t>
             </a:fld>
             <a:endParaRPr lang="en-US"/>
           </a:p>
@@ -2098,7 +2098,7 @@
           <a:p>
             <a:fld id="{7ECA231E-A98D-4CFD-BF7B-F211F4ADBCDA}" type="datetimeFigureOut">
               <a:rPr lang="en-US" smtClean="0"/>
-              <a:t>5/4/2017</a:t>
+              <a:t>6/2/2017</a:t>
             </a:fld>
             <a:endParaRPr lang="en-US"/>
           </a:p>
@@ -2351,7 +2351,7 @@
           <a:p>
             <a:fld id="{7ECA231E-A98D-4CFD-BF7B-F211F4ADBCDA}" type="datetimeFigureOut">
               <a:rPr lang="en-US" smtClean="0"/>
-              <a:t>5/4/2017</a:t>
+              <a:t>6/2/2017</a:t>
             </a:fld>
             <a:endParaRPr lang="en-US"/>
           </a:p>
@@ -2564,7 +2564,7 @@
           <a:p>
             <a:fld id="{7ECA231E-A98D-4CFD-BF7B-F211F4ADBCDA}" type="datetimeFigureOut">
               <a:rPr lang="en-US" smtClean="0"/>
-              <a:t>5/4/2017</a:t>
+              <a:t>6/2/2017</a:t>
             </a:fld>
             <a:endParaRPr lang="en-US"/>
           </a:p>
@@ -3097,7 +3097,7 @@
                 </a:effectLst>
                 <a:latin typeface="Arial Black" panose="020B0A04020102020204" pitchFamily="34" charset="0"/>
               </a:rPr>
-              <a:t>0.0.1</a:t>
+              <a:t>0.0.2</a:t>
             </a:r>
             <a:endParaRPr lang="en-US" sz="3200" dirty="0">
               <a:solidFill>
@@ -3284,11 +3284,32 @@
             <a:pPr algn="ctr"/>
             <a:r>
               <a:rPr lang="en-US" sz="3600" dirty="0" smtClean="0">
+                <a:solidFill>
+                  <a:srgbClr val="C00000">
+                    <a:alpha val="51000"/>
+                  </a:srgbClr>
+                </a:solidFill>
                 <a:latin typeface="Arial Black" panose="020B0A04020102020204" pitchFamily="34" charset="0"/>
               </a:rPr>
-              <a:t>Alpha Release </a:t>
+              <a:t>Alpha Release</a:t>
+            </a:r>
+            <a:r>
+              <a:rPr lang="en-US" sz="3600" dirty="0" smtClean="0">
+                <a:solidFill>
+                  <a:srgbClr val="C00000">
+                    <a:alpha val="74000"/>
+                  </a:srgbClr>
+                </a:solidFill>
+                <a:latin typeface="Arial Black" panose="020B0A04020102020204" pitchFamily="34" charset="0"/>
+              </a:rPr>
+              <a:t> </a:t>
             </a:r>
             <a:endParaRPr lang="en-US" sz="3600" dirty="0">
+              <a:solidFill>
+                <a:srgbClr val="C00000">
+                  <a:alpha val="74000"/>
+                </a:srgbClr>
+              </a:solidFill>
               <a:latin typeface="Arial Black" panose="020B0A04020102020204" pitchFamily="34" charset="0"/>
             </a:endParaRPr>
           </a:p>

</xml_diff>

<commit_message>
tweak to splash screen generator
</commit_message>
<xml_diff>
--- a/pymdwizard/resources/icons/SplashScreenGeneration.pptx
+++ b/pymdwizard/resources/icons/SplashScreenGeneration.pptx
@@ -3212,8 +3212,8 @@
         </p:nvSpPr>
         <p:spPr>
           <a:xfrm>
-            <a:off x="717232" y="480060"/>
-            <a:ext cx="4346526" cy="3472502"/>
+            <a:off x="717232" y="509666"/>
+            <a:ext cx="4346526" cy="3442896"/>
           </a:xfrm>
           <a:prstGeom prst="diagStripe">
             <a:avLst>

</xml_diff>

<commit_message>
Update version to 0.0.3 Beta on Splash
</commit_message>
<xml_diff>
--- a/pymdwizard/resources/icons/SplashScreenGeneration.pptx
+++ b/pymdwizard/resources/icons/SplashScreenGeneration.pptx
@@ -243,7 +243,7 @@
           <a:p>
             <a:fld id="{7ECA231E-A98D-4CFD-BF7B-F211F4ADBCDA}" type="datetimeFigureOut">
               <a:rPr lang="en-US" smtClean="0"/>
-              <a:t>6/2/2017</a:t>
+              <a:t>8/10/2017</a:t>
             </a:fld>
             <a:endParaRPr lang="en-US"/>
           </a:p>
@@ -413,7 +413,7 @@
           <a:p>
             <a:fld id="{7ECA231E-A98D-4CFD-BF7B-F211F4ADBCDA}" type="datetimeFigureOut">
               <a:rPr lang="en-US" smtClean="0"/>
-              <a:t>6/2/2017</a:t>
+              <a:t>8/10/2017</a:t>
             </a:fld>
             <a:endParaRPr lang="en-US"/>
           </a:p>
@@ -593,7 +593,7 @@
           <a:p>
             <a:fld id="{7ECA231E-A98D-4CFD-BF7B-F211F4ADBCDA}" type="datetimeFigureOut">
               <a:rPr lang="en-US" smtClean="0"/>
-              <a:t>6/2/2017</a:t>
+              <a:t>8/10/2017</a:t>
             </a:fld>
             <a:endParaRPr lang="en-US"/>
           </a:p>
@@ -763,7 +763,7 @@
           <a:p>
             <a:fld id="{7ECA231E-A98D-4CFD-BF7B-F211F4ADBCDA}" type="datetimeFigureOut">
               <a:rPr lang="en-US" smtClean="0"/>
-              <a:t>6/2/2017</a:t>
+              <a:t>8/10/2017</a:t>
             </a:fld>
             <a:endParaRPr lang="en-US"/>
           </a:p>
@@ -1009,7 +1009,7 @@
           <a:p>
             <a:fld id="{7ECA231E-A98D-4CFD-BF7B-F211F4ADBCDA}" type="datetimeFigureOut">
               <a:rPr lang="en-US" smtClean="0"/>
-              <a:t>6/2/2017</a:t>
+              <a:t>8/10/2017</a:t>
             </a:fld>
             <a:endParaRPr lang="en-US"/>
           </a:p>
@@ -1241,7 +1241,7 @@
           <a:p>
             <a:fld id="{7ECA231E-A98D-4CFD-BF7B-F211F4ADBCDA}" type="datetimeFigureOut">
               <a:rPr lang="en-US" smtClean="0"/>
-              <a:t>6/2/2017</a:t>
+              <a:t>8/10/2017</a:t>
             </a:fld>
             <a:endParaRPr lang="en-US"/>
           </a:p>
@@ -1608,7 +1608,7 @@
           <a:p>
             <a:fld id="{7ECA231E-A98D-4CFD-BF7B-F211F4ADBCDA}" type="datetimeFigureOut">
               <a:rPr lang="en-US" smtClean="0"/>
-              <a:t>6/2/2017</a:t>
+              <a:t>8/10/2017</a:t>
             </a:fld>
             <a:endParaRPr lang="en-US"/>
           </a:p>
@@ -1726,7 +1726,7 @@
           <a:p>
             <a:fld id="{7ECA231E-A98D-4CFD-BF7B-F211F4ADBCDA}" type="datetimeFigureOut">
               <a:rPr lang="en-US" smtClean="0"/>
-              <a:t>6/2/2017</a:t>
+              <a:t>8/10/2017</a:t>
             </a:fld>
             <a:endParaRPr lang="en-US"/>
           </a:p>
@@ -1821,7 +1821,7 @@
           <a:p>
             <a:fld id="{7ECA231E-A98D-4CFD-BF7B-F211F4ADBCDA}" type="datetimeFigureOut">
               <a:rPr lang="en-US" smtClean="0"/>
-              <a:t>6/2/2017</a:t>
+              <a:t>8/10/2017</a:t>
             </a:fld>
             <a:endParaRPr lang="en-US"/>
           </a:p>
@@ -2098,7 +2098,7 @@
           <a:p>
             <a:fld id="{7ECA231E-A98D-4CFD-BF7B-F211F4ADBCDA}" type="datetimeFigureOut">
               <a:rPr lang="en-US" smtClean="0"/>
-              <a:t>6/2/2017</a:t>
+              <a:t>8/10/2017</a:t>
             </a:fld>
             <a:endParaRPr lang="en-US"/>
           </a:p>
@@ -2351,7 +2351,7 @@
           <a:p>
             <a:fld id="{7ECA231E-A98D-4CFD-BF7B-F211F4ADBCDA}" type="datetimeFigureOut">
               <a:rPr lang="en-US" smtClean="0"/>
-              <a:t>6/2/2017</a:t>
+              <a:t>8/10/2017</a:t>
             </a:fld>
             <a:endParaRPr lang="en-US"/>
           </a:p>
@@ -2564,7 +2564,7 @@
           <a:p>
             <a:fld id="{7ECA231E-A98D-4CFD-BF7B-F211F4ADBCDA}" type="datetimeFigureOut">
               <a:rPr lang="en-US" smtClean="0"/>
-              <a:t>6/2/2017</a:t>
+              <a:t>8/10/2017</a:t>
             </a:fld>
             <a:endParaRPr lang="en-US"/>
           </a:p>
@@ -3097,7 +3097,7 @@
                 </a:effectLst>
                 <a:latin typeface="Arial Black" panose="020B0A04020102020204" pitchFamily="34" charset="0"/>
               </a:rPr>
-              <a:t>0.0.2</a:t>
+              <a:t>0.0.3</a:t>
             </a:r>
             <a:endParaRPr lang="en-US" sz="3200" dirty="0">
               <a:solidFill>
@@ -3291,7 +3291,18 @@
                 </a:solidFill>
                 <a:latin typeface="Arial Black" panose="020B0A04020102020204" pitchFamily="34" charset="0"/>
               </a:rPr>
-              <a:t>Alpha Release</a:t>
+              <a:t>Beta </a:t>
+            </a:r>
+            <a:r>
+              <a:rPr lang="en-US" sz="3600" dirty="0" smtClean="0">
+                <a:solidFill>
+                  <a:srgbClr val="C00000">
+                    <a:alpha val="51000"/>
+                  </a:srgbClr>
+                </a:solidFill>
+                <a:latin typeface="Arial Black" panose="020B0A04020102020204" pitchFamily="34" charset="0"/>
+              </a:rPr>
+              <a:t>Release</a:t>
             </a:r>
             <a:r>
               <a:rPr lang="en-US" sz="3600" dirty="0" smtClean="0">

</xml_diff>

<commit_message>
update splash screen to 2.0
</commit_message>
<xml_diff>
--- a/pymdwizard/resources/icons/SplashScreenGeneration.pptx
+++ b/pymdwizard/resources/icons/SplashScreenGeneration.pptx
@@ -6,6 +6,7 @@
   </p:sldMasterIdLst>
   <p:sldIdLst>
     <p:sldId id="256" r:id="rId2"/>
+    <p:sldId id="257" r:id="rId3"/>
   </p:sldIdLst>
   <p:sldSz cx="12192000" cy="6858000"/>
   <p:notesSz cx="6858000" cy="9144000"/>
@@ -243,7 +244,7 @@
           <a:p>
             <a:fld id="{7ECA231E-A98D-4CFD-BF7B-F211F4ADBCDA}" type="datetimeFigureOut">
               <a:rPr lang="en-US" smtClean="0"/>
-              <a:t>8/10/2017</a:t>
+              <a:t>9/19/2017</a:t>
             </a:fld>
             <a:endParaRPr lang="en-US"/>
           </a:p>
@@ -413,7 +414,7 @@
           <a:p>
             <a:fld id="{7ECA231E-A98D-4CFD-BF7B-F211F4ADBCDA}" type="datetimeFigureOut">
               <a:rPr lang="en-US" smtClean="0"/>
-              <a:t>8/10/2017</a:t>
+              <a:t>9/19/2017</a:t>
             </a:fld>
             <a:endParaRPr lang="en-US"/>
           </a:p>
@@ -593,7 +594,7 @@
           <a:p>
             <a:fld id="{7ECA231E-A98D-4CFD-BF7B-F211F4ADBCDA}" type="datetimeFigureOut">
               <a:rPr lang="en-US" smtClean="0"/>
-              <a:t>8/10/2017</a:t>
+              <a:t>9/19/2017</a:t>
             </a:fld>
             <a:endParaRPr lang="en-US"/>
           </a:p>
@@ -763,7 +764,7 @@
           <a:p>
             <a:fld id="{7ECA231E-A98D-4CFD-BF7B-F211F4ADBCDA}" type="datetimeFigureOut">
               <a:rPr lang="en-US" smtClean="0"/>
-              <a:t>8/10/2017</a:t>
+              <a:t>9/19/2017</a:t>
             </a:fld>
             <a:endParaRPr lang="en-US"/>
           </a:p>
@@ -1009,7 +1010,7 @@
           <a:p>
             <a:fld id="{7ECA231E-A98D-4CFD-BF7B-F211F4ADBCDA}" type="datetimeFigureOut">
               <a:rPr lang="en-US" smtClean="0"/>
-              <a:t>8/10/2017</a:t>
+              <a:t>9/19/2017</a:t>
             </a:fld>
             <a:endParaRPr lang="en-US"/>
           </a:p>
@@ -1241,7 +1242,7 @@
           <a:p>
             <a:fld id="{7ECA231E-A98D-4CFD-BF7B-F211F4ADBCDA}" type="datetimeFigureOut">
               <a:rPr lang="en-US" smtClean="0"/>
-              <a:t>8/10/2017</a:t>
+              <a:t>9/19/2017</a:t>
             </a:fld>
             <a:endParaRPr lang="en-US"/>
           </a:p>
@@ -1608,7 +1609,7 @@
           <a:p>
             <a:fld id="{7ECA231E-A98D-4CFD-BF7B-F211F4ADBCDA}" type="datetimeFigureOut">
               <a:rPr lang="en-US" smtClean="0"/>
-              <a:t>8/10/2017</a:t>
+              <a:t>9/19/2017</a:t>
             </a:fld>
             <a:endParaRPr lang="en-US"/>
           </a:p>
@@ -1726,7 +1727,7 @@
           <a:p>
             <a:fld id="{7ECA231E-A98D-4CFD-BF7B-F211F4ADBCDA}" type="datetimeFigureOut">
               <a:rPr lang="en-US" smtClean="0"/>
-              <a:t>8/10/2017</a:t>
+              <a:t>9/19/2017</a:t>
             </a:fld>
             <a:endParaRPr lang="en-US"/>
           </a:p>
@@ -1821,7 +1822,7 @@
           <a:p>
             <a:fld id="{7ECA231E-A98D-4CFD-BF7B-F211F4ADBCDA}" type="datetimeFigureOut">
               <a:rPr lang="en-US" smtClean="0"/>
-              <a:t>8/10/2017</a:t>
+              <a:t>9/19/2017</a:t>
             </a:fld>
             <a:endParaRPr lang="en-US"/>
           </a:p>
@@ -2098,7 +2099,7 @@
           <a:p>
             <a:fld id="{7ECA231E-A98D-4CFD-BF7B-F211F4ADBCDA}" type="datetimeFigureOut">
               <a:rPr lang="en-US" smtClean="0"/>
-              <a:t>8/10/2017</a:t>
+              <a:t>9/19/2017</a:t>
             </a:fld>
             <a:endParaRPr lang="en-US"/>
           </a:p>
@@ -2351,7 +2352,7 @@
           <a:p>
             <a:fld id="{7ECA231E-A98D-4CFD-BF7B-F211F4ADBCDA}" type="datetimeFigureOut">
               <a:rPr lang="en-US" smtClean="0"/>
-              <a:t>8/10/2017</a:t>
+              <a:t>9/19/2017</a:t>
             </a:fld>
             <a:endParaRPr lang="en-US"/>
           </a:p>
@@ -2564,7 +2565,7 @@
           <a:p>
             <a:fld id="{7ECA231E-A98D-4CFD-BF7B-F211F4ADBCDA}" type="datetimeFigureOut">
               <a:rPr lang="en-US" smtClean="0"/>
-              <a:t>8/10/2017</a:t>
+              <a:t>9/19/2017</a:t>
             </a:fld>
             <a:endParaRPr lang="en-US"/>
           </a:p>
@@ -3291,18 +3292,7 @@
                 </a:solidFill>
                 <a:latin typeface="Arial Black" panose="020B0A04020102020204" pitchFamily="34" charset="0"/>
               </a:rPr>
-              <a:t>Beta </a:t>
-            </a:r>
-            <a:r>
-              <a:rPr lang="en-US" sz="3600" dirty="0" smtClean="0">
-                <a:solidFill>
-                  <a:srgbClr val="C00000">
-                    <a:alpha val="51000"/>
-                  </a:srgbClr>
-                </a:solidFill>
-                <a:latin typeface="Arial Black" panose="020B0A04020102020204" pitchFamily="34" charset="0"/>
-              </a:rPr>
-              <a:t>Release</a:t>
+              <a:t>Beta Release</a:t>
             </a:r>
             <a:r>
               <a:rPr lang="en-US" sz="3600" dirty="0" smtClean="0">
@@ -3379,6 +3369,320 @@
     <p:extLst>
       <p:ext uri="{BB962C8B-B14F-4D97-AF65-F5344CB8AC3E}">
         <p14:creationId xmlns:p14="http://schemas.microsoft.com/office/powerpoint/2010/main" val="940462204"/>
+      </p:ext>
+    </p:extLst>
+  </p:cSld>
+  <p:clrMapOvr>
+    <a:masterClrMapping/>
+  </p:clrMapOvr>
+</p:sld>
+</file>
+
+<file path=ppt/slides/slide2.xml><?xml version="1.0" encoding="utf-8"?>
+<p:sld xmlns:a="http://schemas.openxmlformats.org/drawingml/2006/main" xmlns:r="http://schemas.openxmlformats.org/officeDocument/2006/relationships" xmlns:p="http://schemas.openxmlformats.org/presentationml/2006/main">
+  <p:cSld>
+    <p:spTree>
+      <p:nvGrpSpPr>
+        <p:cNvPr id="1" name=""/>
+        <p:cNvGrpSpPr/>
+        <p:nvPr/>
+      </p:nvGrpSpPr>
+      <p:grpSpPr>
+        <a:xfrm>
+          <a:off x="0" y="0"/>
+          <a:ext cx="0" cy="0"/>
+          <a:chOff x="0" y="0"/>
+          <a:chExt cx="0" cy="0"/>
+        </a:xfrm>
+      </p:grpSpPr>
+      <p:pic>
+        <p:nvPicPr>
+          <p:cNvPr id="4" name="Picture 3"/>
+          <p:cNvPicPr>
+            <a:picLocks noChangeAspect="1"/>
+          </p:cNvPicPr>
+          <p:nvPr/>
+        </p:nvPicPr>
+        <p:blipFill>
+          <a:blip r:embed="rId2">
+            <a:extLst>
+              <a:ext uri="{28A0092B-C50C-407E-A947-70E740481C1C}">
+                <a14:useLocalDpi xmlns:a14="http://schemas.microsoft.com/office/drawing/2010/main" val="0"/>
+              </a:ext>
+            </a:extLst>
+          </a:blip>
+          <a:stretch>
+            <a:fillRect/>
+          </a:stretch>
+        </p:blipFill>
+        <p:spPr>
+          <a:xfrm>
+            <a:off x="701992" y="480060"/>
+            <a:ext cx="10696575" cy="5867400"/>
+          </a:xfrm>
+          <a:prstGeom prst="rect">
+            <a:avLst/>
+          </a:prstGeom>
+        </p:spPr>
+      </p:pic>
+      <p:sp>
+        <p:nvSpPr>
+          <p:cNvPr id="5" name="TextBox 4"/>
+          <p:cNvSpPr txBox="1"/>
+          <p:nvPr/>
+        </p:nvSpPr>
+        <p:spPr>
+          <a:xfrm>
+            <a:off x="1590754" y="708338"/>
+            <a:ext cx="8955325" cy="1200329"/>
+          </a:xfrm>
+          <a:prstGeom prst="rect">
+            <a:avLst/>
+          </a:prstGeom>
+          <a:noFill/>
+        </p:spPr>
+        <p:txBody>
+          <a:bodyPr wrap="square" rtlCol="0">
+            <a:spAutoFit/>
+          </a:bodyPr>
+          <a:lstStyle/>
+          <a:p>
+            <a:pPr algn="ctr"/>
+            <a:r>
+              <a:rPr lang="en-US" sz="7200" dirty="0" smtClean="0">
+                <a:solidFill>
+                  <a:schemeClr val="bg1">
+                    <a:lumMod val="95000"/>
+                  </a:schemeClr>
+                </a:solidFill>
+                <a:effectLst>
+                  <a:outerShdw blurRad="63500" dist="88900" dir="2700000" algn="tl" rotWithShape="0">
+                    <a:prstClr val="black">
+                      <a:alpha val="40000"/>
+                    </a:prstClr>
+                  </a:outerShdw>
+                </a:effectLst>
+                <a:latin typeface="Arial Black" panose="020B0A04020102020204" pitchFamily="34" charset="0"/>
+              </a:rPr>
+              <a:t>Metadata Wizard</a:t>
+            </a:r>
+            <a:endParaRPr lang="en-US" sz="7200" dirty="0">
+              <a:solidFill>
+                <a:schemeClr val="bg1">
+                  <a:lumMod val="95000"/>
+                </a:schemeClr>
+              </a:solidFill>
+              <a:effectLst>
+                <a:outerShdw blurRad="63500" dist="88900" dir="2700000" algn="tl" rotWithShape="0">
+                  <a:prstClr val="black">
+                    <a:alpha val="40000"/>
+                  </a:prstClr>
+                </a:outerShdw>
+              </a:effectLst>
+              <a:latin typeface="Arial Black" panose="020B0A04020102020204" pitchFamily="34" charset="0"/>
+            </a:endParaRPr>
+          </a:p>
+        </p:txBody>
+      </p:sp>
+      <p:sp>
+        <p:nvSpPr>
+          <p:cNvPr id="6" name="TextBox 5"/>
+          <p:cNvSpPr txBox="1"/>
+          <p:nvPr/>
+        </p:nvSpPr>
+        <p:spPr>
+          <a:xfrm>
+            <a:off x="7168449" y="1762515"/>
+            <a:ext cx="3240470" cy="584775"/>
+          </a:xfrm>
+          <a:prstGeom prst="rect">
+            <a:avLst/>
+          </a:prstGeom>
+          <a:noFill/>
+        </p:spPr>
+        <p:txBody>
+          <a:bodyPr wrap="square" rtlCol="0">
+            <a:spAutoFit/>
+          </a:bodyPr>
+          <a:lstStyle/>
+          <a:p>
+            <a:pPr algn="r"/>
+            <a:r>
+              <a:rPr lang="en-US" sz="3200" dirty="0" smtClean="0">
+                <a:solidFill>
+                  <a:schemeClr val="bg1">
+                    <a:lumMod val="95000"/>
+                  </a:schemeClr>
+                </a:solidFill>
+                <a:effectLst>
+                  <a:outerShdw blurRad="63500" dist="88900" dir="2700000" algn="tl" rotWithShape="0">
+                    <a:prstClr val="black">
+                      <a:alpha val="40000"/>
+                    </a:prstClr>
+                  </a:outerShdw>
+                </a:effectLst>
+                <a:latin typeface="Arial Black" panose="020B0A04020102020204" pitchFamily="34" charset="0"/>
+              </a:rPr>
+              <a:t>2.0.0</a:t>
+            </a:r>
+            <a:endParaRPr lang="en-US" sz="3200" dirty="0">
+              <a:solidFill>
+                <a:schemeClr val="bg1">
+                  <a:lumMod val="95000"/>
+                </a:schemeClr>
+              </a:solidFill>
+              <a:effectLst>
+                <a:outerShdw blurRad="63500" dist="88900" dir="2700000" algn="tl" rotWithShape="0">
+                  <a:prstClr val="black">
+                    <a:alpha val="40000"/>
+                  </a:prstClr>
+                </a:outerShdw>
+              </a:effectLst>
+              <a:latin typeface="Arial Black" panose="020B0A04020102020204" pitchFamily="34" charset="0"/>
+            </a:endParaRPr>
+          </a:p>
+        </p:txBody>
+      </p:sp>
+      <p:sp>
+        <p:nvSpPr>
+          <p:cNvPr id="7" name="TextBox 6"/>
+          <p:cNvSpPr txBox="1"/>
+          <p:nvPr/>
+        </p:nvSpPr>
+        <p:spPr>
+          <a:xfrm>
+            <a:off x="832130" y="4982175"/>
+            <a:ext cx="7457798" cy="1200329"/>
+          </a:xfrm>
+          <a:prstGeom prst="rect">
+            <a:avLst/>
+          </a:prstGeom>
+          <a:noFill/>
+        </p:spPr>
+        <p:txBody>
+          <a:bodyPr wrap="square" rtlCol="0">
+            <a:spAutoFit/>
+          </a:bodyPr>
+          <a:lstStyle/>
+          <a:p>
+            <a:r>
+              <a:rPr lang="en-US" sz="1200" dirty="0" smtClean="0">
+                <a:solidFill>
+                  <a:schemeClr val="bg1">
+                    <a:lumMod val="95000"/>
+                  </a:schemeClr>
+                </a:solidFill>
+                <a:latin typeface="Arial" panose="020B0604020202020204" pitchFamily="34" charset="0"/>
+                <a:cs typeface="Arial" panose="020B0604020202020204" pitchFamily="34" charset="0"/>
+              </a:rPr>
+              <a:t>This software is preliminary or provisional and is subject to revision. It is being provided to meet the need for timely best science. The software has not received final approval by the U.S. Geological Survey (USGS). No warranty, expressed or implied, is made by the USGS or the U.S. Government as to the functionality of the software and related material nor shall the fact of release constitute any such warranty. The software is provided on the condition that neither the USGS nor the U.S. Government shall be held liable for any damages resulting from the authorized or unauthorized use of the software.</a:t>
+            </a:r>
+            <a:endParaRPr lang="en-US" sz="1200" dirty="0">
+              <a:solidFill>
+                <a:schemeClr val="bg1">
+                  <a:lumMod val="95000"/>
+                </a:schemeClr>
+              </a:solidFill>
+              <a:latin typeface="Arial" panose="020B0604020202020204" pitchFamily="34" charset="0"/>
+              <a:cs typeface="Arial" panose="020B0604020202020204" pitchFamily="34" charset="0"/>
+            </a:endParaRPr>
+          </a:p>
+        </p:txBody>
+      </p:sp>
+      <p:pic>
+        <p:nvPicPr>
+          <p:cNvPr id="1028" name="Picture 4" descr="Image result for usgs logo white"/>
+          <p:cNvPicPr>
+            <a:picLocks noChangeAspect="1" noChangeArrowheads="1"/>
+          </p:cNvPicPr>
+          <p:nvPr/>
+        </p:nvPicPr>
+        <p:blipFill>
+          <a:blip r:embed="rId3">
+            <a:extLst>
+              <a:ext uri="{28A0092B-C50C-407E-A947-70E740481C1C}">
+                <a14:useLocalDpi xmlns:a14="http://schemas.microsoft.com/office/drawing/2010/main" val="0"/>
+              </a:ext>
+            </a:extLst>
+          </a:blip>
+          <a:srcRect/>
+          <a:stretch>
+            <a:fillRect/>
+          </a:stretch>
+        </p:blipFill>
+        <p:spPr bwMode="auto">
+          <a:xfrm>
+            <a:off x="8469825" y="4982175"/>
+            <a:ext cx="2748844" cy="1200329"/>
+          </a:xfrm>
+          <a:prstGeom prst="rect">
+            <a:avLst/>
+          </a:prstGeom>
+          <a:noFill/>
+          <a:extLst>
+            <a:ext uri="{909E8E84-426E-40DD-AFC4-6F175D3DCCD1}">
+              <a14:hiddenFill xmlns:a14="http://schemas.microsoft.com/office/drawing/2010/main">
+                <a:solidFill>
+                  <a:srgbClr val="FFFFFF"/>
+                </a:solidFill>
+              </a14:hiddenFill>
+            </a:ext>
+          </a:extLst>
+        </p:spPr>
+      </p:pic>
+      <p:sp>
+        <p:nvSpPr>
+          <p:cNvPr id="3" name="Rectangle 2"/>
+          <p:cNvSpPr/>
+          <p:nvPr/>
+        </p:nvSpPr>
+        <p:spPr>
+          <a:xfrm>
+            <a:off x="706161" y="480060"/>
+            <a:ext cx="10692405" cy="5867400"/>
+          </a:xfrm>
+          <a:prstGeom prst="rect">
+            <a:avLst/>
+          </a:prstGeom>
+          <a:noFill/>
+          <a:ln>
+            <a:solidFill>
+              <a:schemeClr val="tx1">
+                <a:lumMod val="85000"/>
+                <a:lumOff val="15000"/>
+              </a:schemeClr>
+            </a:solidFill>
+          </a:ln>
+        </p:spPr>
+        <p:style>
+          <a:lnRef idx="2">
+            <a:schemeClr val="accent1">
+              <a:shade val="50000"/>
+            </a:schemeClr>
+          </a:lnRef>
+          <a:fillRef idx="1">
+            <a:schemeClr val="accent1"/>
+          </a:fillRef>
+          <a:effectRef idx="0">
+            <a:schemeClr val="accent1"/>
+          </a:effectRef>
+          <a:fontRef idx="minor">
+            <a:schemeClr val="lt1"/>
+          </a:fontRef>
+        </p:style>
+        <p:txBody>
+          <a:bodyPr rtlCol="0" anchor="ctr"/>
+          <a:lstStyle/>
+          <a:p>
+            <a:pPr algn="ctr"/>
+            <a:endParaRPr lang="en-US"/>
+          </a:p>
+        </p:txBody>
+      </p:sp>
+    </p:spTree>
+    <p:extLst>
+      <p:ext uri="{BB962C8B-B14F-4D97-AF65-F5344CB8AC3E}">
+        <p14:creationId xmlns:p14="http://schemas.microsoft.com/office/powerpoint/2010/main" val="3022652148"/>
       </p:ext>
     </p:extLst>
   </p:cSld>

</xml_diff>

<commit_message>
Software review reconciliation changes
</commit_message>
<xml_diff>
--- a/pymdwizard/resources/icons/SplashScreenGeneration.pptx
+++ b/pymdwizard/resources/icons/SplashScreenGeneration.pptx
@@ -244,7 +244,7 @@
           <a:p>
             <a:fld id="{7ECA231E-A98D-4CFD-BF7B-F211F4ADBCDA}" type="datetimeFigureOut">
               <a:rPr lang="en-US" smtClean="0"/>
-              <a:t>9/19/2017</a:t>
+              <a:t>11/3/2017</a:t>
             </a:fld>
             <a:endParaRPr lang="en-US"/>
           </a:p>
@@ -414,7 +414,7 @@
           <a:p>
             <a:fld id="{7ECA231E-A98D-4CFD-BF7B-F211F4ADBCDA}" type="datetimeFigureOut">
               <a:rPr lang="en-US" smtClean="0"/>
-              <a:t>9/19/2017</a:t>
+              <a:t>11/3/2017</a:t>
             </a:fld>
             <a:endParaRPr lang="en-US"/>
           </a:p>
@@ -594,7 +594,7 @@
           <a:p>
             <a:fld id="{7ECA231E-A98D-4CFD-BF7B-F211F4ADBCDA}" type="datetimeFigureOut">
               <a:rPr lang="en-US" smtClean="0"/>
-              <a:t>9/19/2017</a:t>
+              <a:t>11/3/2017</a:t>
             </a:fld>
             <a:endParaRPr lang="en-US"/>
           </a:p>
@@ -764,7 +764,7 @@
           <a:p>
             <a:fld id="{7ECA231E-A98D-4CFD-BF7B-F211F4ADBCDA}" type="datetimeFigureOut">
               <a:rPr lang="en-US" smtClean="0"/>
-              <a:t>9/19/2017</a:t>
+              <a:t>11/3/2017</a:t>
             </a:fld>
             <a:endParaRPr lang="en-US"/>
           </a:p>
@@ -1010,7 +1010,7 @@
           <a:p>
             <a:fld id="{7ECA231E-A98D-4CFD-BF7B-F211F4ADBCDA}" type="datetimeFigureOut">
               <a:rPr lang="en-US" smtClean="0"/>
-              <a:t>9/19/2017</a:t>
+              <a:t>11/3/2017</a:t>
             </a:fld>
             <a:endParaRPr lang="en-US"/>
           </a:p>
@@ -1242,7 +1242,7 @@
           <a:p>
             <a:fld id="{7ECA231E-A98D-4CFD-BF7B-F211F4ADBCDA}" type="datetimeFigureOut">
               <a:rPr lang="en-US" smtClean="0"/>
-              <a:t>9/19/2017</a:t>
+              <a:t>11/3/2017</a:t>
             </a:fld>
             <a:endParaRPr lang="en-US"/>
           </a:p>
@@ -1609,7 +1609,7 @@
           <a:p>
             <a:fld id="{7ECA231E-A98D-4CFD-BF7B-F211F4ADBCDA}" type="datetimeFigureOut">
               <a:rPr lang="en-US" smtClean="0"/>
-              <a:t>9/19/2017</a:t>
+              <a:t>11/3/2017</a:t>
             </a:fld>
             <a:endParaRPr lang="en-US"/>
           </a:p>
@@ -1727,7 +1727,7 @@
           <a:p>
             <a:fld id="{7ECA231E-A98D-4CFD-BF7B-F211F4ADBCDA}" type="datetimeFigureOut">
               <a:rPr lang="en-US" smtClean="0"/>
-              <a:t>9/19/2017</a:t>
+              <a:t>11/3/2017</a:t>
             </a:fld>
             <a:endParaRPr lang="en-US"/>
           </a:p>
@@ -1822,7 +1822,7 @@
           <a:p>
             <a:fld id="{7ECA231E-A98D-4CFD-BF7B-F211F4ADBCDA}" type="datetimeFigureOut">
               <a:rPr lang="en-US" smtClean="0"/>
-              <a:t>9/19/2017</a:t>
+              <a:t>11/3/2017</a:t>
             </a:fld>
             <a:endParaRPr lang="en-US"/>
           </a:p>
@@ -2099,7 +2099,7 @@
           <a:p>
             <a:fld id="{7ECA231E-A98D-4CFD-BF7B-F211F4ADBCDA}" type="datetimeFigureOut">
               <a:rPr lang="en-US" smtClean="0"/>
-              <a:t>9/19/2017</a:t>
+              <a:t>11/3/2017</a:t>
             </a:fld>
             <a:endParaRPr lang="en-US"/>
           </a:p>
@@ -2352,7 +2352,7 @@
           <a:p>
             <a:fld id="{7ECA231E-A98D-4CFD-BF7B-F211F4ADBCDA}" type="datetimeFigureOut">
               <a:rPr lang="en-US" smtClean="0"/>
-              <a:t>9/19/2017</a:t>
+              <a:t>11/3/2017</a:t>
             </a:fld>
             <a:endParaRPr lang="en-US"/>
           </a:p>
@@ -2565,7 +2565,7 @@
           <a:p>
             <a:fld id="{7ECA231E-A98D-4CFD-BF7B-F211F4ADBCDA}" type="datetimeFigureOut">
               <a:rPr lang="en-US" smtClean="0"/>
-              <a:t>9/19/2017</a:t>
+              <a:t>11/3/2017</a:t>
             </a:fld>
             <a:endParaRPr lang="en-US"/>
           </a:p>
@@ -3551,8 +3551,8 @@
         </p:nvSpPr>
         <p:spPr>
           <a:xfrm>
-            <a:off x="832130" y="4982175"/>
-            <a:ext cx="7457798" cy="1200329"/>
+            <a:off x="832130" y="4889841"/>
+            <a:ext cx="7457798" cy="1384995"/>
           </a:xfrm>
           <a:prstGeom prst="rect">
             <a:avLst/>
@@ -3565,6 +3565,18 @@
           </a:bodyPr>
           <a:lstStyle/>
           <a:p>
+            <a:r>
+              <a:rPr lang="en-US" sz="1200" dirty="0">
+                <a:solidFill>
+                  <a:schemeClr val="bg1">
+                    <a:lumMod val="95000"/>
+                  </a:schemeClr>
+                </a:solidFill>
+                <a:latin typeface="Arial" panose="020B0604020202020204" pitchFamily="34" charset="0"/>
+                <a:cs typeface="Arial" panose="020B0604020202020204" pitchFamily="34" charset="0"/>
+              </a:rPr>
+              <a:t>This software has been approved for release by the U.S. Geological </a:t>
+            </a:r>
             <a:r>
               <a:rPr lang="en-US" sz="1200" dirty="0" smtClean="0">
                 <a:solidFill>
@@ -3575,7 +3587,225 @@
                 <a:latin typeface="Arial" panose="020B0604020202020204" pitchFamily="34" charset="0"/>
                 <a:cs typeface="Arial" panose="020B0604020202020204" pitchFamily="34" charset="0"/>
               </a:rPr>
-              <a:t>This software is preliminary or provisional and is subject to revision. It is being provided to meet the need for timely best science. The software has not received final approval by the U.S. Geological Survey (USGS). No warranty, expressed or implied, is made by the USGS or the U.S. Government as to the functionality of the software and related material nor shall the fact of release constitute any such warranty. The software is provided on the condition that neither the USGS nor the U.S. Government shall be held liable for any damages resulting from the authorized or unauthorized use of the software.</a:t>
+              <a:t>Survey (USGS</a:t>
+            </a:r>
+            <a:r>
+              <a:rPr lang="en-US" sz="1200" dirty="0">
+                <a:solidFill>
+                  <a:schemeClr val="bg1">
+                    <a:lumMod val="95000"/>
+                  </a:schemeClr>
+                </a:solidFill>
+                <a:latin typeface="Arial" panose="020B0604020202020204" pitchFamily="34" charset="0"/>
+                <a:cs typeface="Arial" panose="020B0604020202020204" pitchFamily="34" charset="0"/>
+              </a:rPr>
+              <a:t>). Although the software has been subjected to rigorous review, the </a:t>
+            </a:r>
+            <a:r>
+              <a:rPr lang="en-US" sz="1200" dirty="0" smtClean="0">
+                <a:solidFill>
+                  <a:schemeClr val="bg1">
+                    <a:lumMod val="95000"/>
+                  </a:schemeClr>
+                </a:solidFill>
+                <a:latin typeface="Arial" panose="020B0604020202020204" pitchFamily="34" charset="0"/>
+                <a:cs typeface="Arial" panose="020B0604020202020204" pitchFamily="34" charset="0"/>
+              </a:rPr>
+              <a:t>USGS reserves </a:t>
+            </a:r>
+            <a:r>
+              <a:rPr lang="en-US" sz="1200" dirty="0">
+                <a:solidFill>
+                  <a:schemeClr val="bg1">
+                    <a:lumMod val="95000"/>
+                  </a:schemeClr>
+                </a:solidFill>
+                <a:latin typeface="Arial" panose="020B0604020202020204" pitchFamily="34" charset="0"/>
+                <a:cs typeface="Arial" panose="020B0604020202020204" pitchFamily="34" charset="0"/>
+              </a:rPr>
+              <a:t>the right to update the software as </a:t>
+            </a:r>
+            <a:r>
+              <a:rPr lang="en-US" sz="1200" dirty="0" smtClean="0">
+                <a:solidFill>
+                  <a:schemeClr val="bg1">
+                    <a:lumMod val="95000"/>
+                  </a:schemeClr>
+                </a:solidFill>
+                <a:latin typeface="Arial" panose="020B0604020202020204" pitchFamily="34" charset="0"/>
+                <a:cs typeface="Arial" panose="020B0604020202020204" pitchFamily="34" charset="0"/>
+              </a:rPr>
+              <a:t>needed pursuant </a:t>
+            </a:r>
+            <a:r>
+              <a:rPr lang="en-US" sz="1200" dirty="0">
+                <a:solidFill>
+                  <a:schemeClr val="bg1">
+                    <a:lumMod val="95000"/>
+                  </a:schemeClr>
+                </a:solidFill>
+                <a:latin typeface="Arial" panose="020B0604020202020204" pitchFamily="34" charset="0"/>
+                <a:cs typeface="Arial" panose="020B0604020202020204" pitchFamily="34" charset="0"/>
+              </a:rPr>
+              <a:t>to further </a:t>
+            </a:r>
+            <a:r>
+              <a:rPr lang="en-US" sz="1200" dirty="0" smtClean="0">
+                <a:solidFill>
+                  <a:schemeClr val="bg1">
+                    <a:lumMod val="95000"/>
+                  </a:schemeClr>
+                </a:solidFill>
+                <a:latin typeface="Arial" panose="020B0604020202020204" pitchFamily="34" charset="0"/>
+                <a:cs typeface="Arial" panose="020B0604020202020204" pitchFamily="34" charset="0"/>
+              </a:rPr>
+              <a:t>analysis and </a:t>
+            </a:r>
+            <a:r>
+              <a:rPr lang="en-US" sz="1200" dirty="0">
+                <a:solidFill>
+                  <a:schemeClr val="bg1">
+                    <a:lumMod val="95000"/>
+                  </a:schemeClr>
+                </a:solidFill>
+                <a:latin typeface="Arial" panose="020B0604020202020204" pitchFamily="34" charset="0"/>
+                <a:cs typeface="Arial" panose="020B0604020202020204" pitchFamily="34" charset="0"/>
+              </a:rPr>
+              <a:t>review. No warranty, expressed or implied, is made by the USGS or the </a:t>
+            </a:r>
+            <a:r>
+              <a:rPr lang="en-US" sz="1200" dirty="0" smtClean="0">
+                <a:solidFill>
+                  <a:schemeClr val="bg1">
+                    <a:lumMod val="95000"/>
+                  </a:schemeClr>
+                </a:solidFill>
+                <a:latin typeface="Arial" panose="020B0604020202020204" pitchFamily="34" charset="0"/>
+                <a:cs typeface="Arial" panose="020B0604020202020204" pitchFamily="34" charset="0"/>
+              </a:rPr>
+              <a:t>U.S. Government </a:t>
+            </a:r>
+            <a:r>
+              <a:rPr lang="en-US" sz="1200" dirty="0">
+                <a:solidFill>
+                  <a:schemeClr val="bg1">
+                    <a:lumMod val="95000"/>
+                  </a:schemeClr>
+                </a:solidFill>
+                <a:latin typeface="Arial" panose="020B0604020202020204" pitchFamily="34" charset="0"/>
+                <a:cs typeface="Arial" panose="020B0604020202020204" pitchFamily="34" charset="0"/>
+              </a:rPr>
+              <a:t>as to the functionality of the software and related material </a:t>
+            </a:r>
+            <a:r>
+              <a:rPr lang="en-US" sz="1200" dirty="0" smtClean="0">
+                <a:solidFill>
+                  <a:schemeClr val="bg1">
+                    <a:lumMod val="95000"/>
+                  </a:schemeClr>
+                </a:solidFill>
+                <a:latin typeface="Arial" panose="020B0604020202020204" pitchFamily="34" charset="0"/>
+                <a:cs typeface="Arial" panose="020B0604020202020204" pitchFamily="34" charset="0"/>
+              </a:rPr>
+              <a:t>nor shall </a:t>
+            </a:r>
+            <a:r>
+              <a:rPr lang="en-US" sz="1200" dirty="0">
+                <a:solidFill>
+                  <a:schemeClr val="bg1">
+                    <a:lumMod val="95000"/>
+                  </a:schemeClr>
+                </a:solidFill>
+                <a:latin typeface="Arial" panose="020B0604020202020204" pitchFamily="34" charset="0"/>
+                <a:cs typeface="Arial" panose="020B0604020202020204" pitchFamily="34" charset="0"/>
+              </a:rPr>
+              <a:t>the fact of </a:t>
+            </a:r>
+            <a:r>
+              <a:rPr lang="en-US" sz="1200" dirty="0" smtClean="0">
+                <a:solidFill>
+                  <a:schemeClr val="bg1">
+                    <a:lumMod val="95000"/>
+                  </a:schemeClr>
+                </a:solidFill>
+                <a:latin typeface="Arial" panose="020B0604020202020204" pitchFamily="34" charset="0"/>
+                <a:cs typeface="Arial" panose="020B0604020202020204" pitchFamily="34" charset="0"/>
+              </a:rPr>
+              <a:t>release constitute </a:t>
+            </a:r>
+            <a:r>
+              <a:rPr lang="en-US" sz="1200" dirty="0">
+                <a:solidFill>
+                  <a:schemeClr val="bg1">
+                    <a:lumMod val="95000"/>
+                  </a:schemeClr>
+                </a:solidFill>
+                <a:latin typeface="Arial" panose="020B0604020202020204" pitchFamily="34" charset="0"/>
+                <a:cs typeface="Arial" panose="020B0604020202020204" pitchFamily="34" charset="0"/>
+              </a:rPr>
+              <a:t>any such warranty. Furthermore, </a:t>
+            </a:r>
+            <a:r>
+              <a:rPr lang="en-US" sz="1200" dirty="0" smtClean="0">
+                <a:solidFill>
+                  <a:schemeClr val="bg1">
+                    <a:lumMod val="95000"/>
+                  </a:schemeClr>
+                </a:solidFill>
+                <a:latin typeface="Arial" panose="020B0604020202020204" pitchFamily="34" charset="0"/>
+                <a:cs typeface="Arial" panose="020B0604020202020204" pitchFamily="34" charset="0"/>
+              </a:rPr>
+              <a:t>the software </a:t>
+            </a:r>
+            <a:r>
+              <a:rPr lang="en-US" sz="1200" dirty="0">
+                <a:solidFill>
+                  <a:schemeClr val="bg1">
+                    <a:lumMod val="95000"/>
+                  </a:schemeClr>
+                </a:solidFill>
+                <a:latin typeface="Arial" panose="020B0604020202020204" pitchFamily="34" charset="0"/>
+                <a:cs typeface="Arial" panose="020B0604020202020204" pitchFamily="34" charset="0"/>
+              </a:rPr>
+              <a:t>is released on condition that neither the USGS nor the U.S. </a:t>
+            </a:r>
+            <a:r>
+              <a:rPr lang="en-US" sz="1200" dirty="0" smtClean="0">
+                <a:solidFill>
+                  <a:schemeClr val="bg1">
+                    <a:lumMod val="95000"/>
+                  </a:schemeClr>
+                </a:solidFill>
+                <a:latin typeface="Arial" panose="020B0604020202020204" pitchFamily="34" charset="0"/>
+                <a:cs typeface="Arial" panose="020B0604020202020204" pitchFamily="34" charset="0"/>
+              </a:rPr>
+              <a:t>Government shall </a:t>
+            </a:r>
+            <a:r>
+              <a:rPr lang="en-US" sz="1200" dirty="0">
+                <a:solidFill>
+                  <a:schemeClr val="bg1">
+                    <a:lumMod val="95000"/>
+                  </a:schemeClr>
+                </a:solidFill>
+                <a:latin typeface="Arial" panose="020B0604020202020204" pitchFamily="34" charset="0"/>
+                <a:cs typeface="Arial" panose="020B0604020202020204" pitchFamily="34" charset="0"/>
+              </a:rPr>
+              <a:t>be held liable for any damages resulting from its authorized or</a:t>
+            </a:r>
+          </a:p>
+          <a:p>
+            <a:r>
+              <a:rPr lang="en-US" sz="1200" dirty="0">
+                <a:solidFill>
+                  <a:schemeClr val="bg1">
+                    <a:lumMod val="95000"/>
+                  </a:schemeClr>
+                </a:solidFill>
+                <a:latin typeface="Arial" panose="020B0604020202020204" pitchFamily="34" charset="0"/>
+                <a:cs typeface="Arial" panose="020B0604020202020204" pitchFamily="34" charset="0"/>
+              </a:rPr>
+              <a:t>unauthorized use.</a:t>
             </a:r>
             <a:endParaRPr lang="en-US" sz="1200" dirty="0">
               <a:solidFill>

</xml_diff>

<commit_message>
Revert "Software review reconciliation changes"
This reverts commit 6f09400b7b97b610d87efb29d4137496b21cfba7.
</commit_message>
<xml_diff>
--- a/pymdwizard/resources/icons/SplashScreenGeneration.pptx
+++ b/pymdwizard/resources/icons/SplashScreenGeneration.pptx
@@ -244,7 +244,7 @@
           <a:p>
             <a:fld id="{7ECA231E-A98D-4CFD-BF7B-F211F4ADBCDA}" type="datetimeFigureOut">
               <a:rPr lang="en-US" smtClean="0"/>
-              <a:t>9/19/2017</a:t>
+              <a:t>11/3/2017</a:t>
             </a:fld>
             <a:endParaRPr lang="en-US"/>
           </a:p>
@@ -414,7 +414,7 @@
           <a:p>
             <a:fld id="{7ECA231E-A98D-4CFD-BF7B-F211F4ADBCDA}" type="datetimeFigureOut">
               <a:rPr lang="en-US" smtClean="0"/>
-              <a:t>9/19/2017</a:t>
+              <a:t>11/3/2017</a:t>
             </a:fld>
             <a:endParaRPr lang="en-US"/>
           </a:p>
@@ -594,7 +594,7 @@
           <a:p>
             <a:fld id="{7ECA231E-A98D-4CFD-BF7B-F211F4ADBCDA}" type="datetimeFigureOut">
               <a:rPr lang="en-US" smtClean="0"/>
-              <a:t>9/19/2017</a:t>
+              <a:t>11/3/2017</a:t>
             </a:fld>
             <a:endParaRPr lang="en-US"/>
           </a:p>
@@ -764,7 +764,7 @@
           <a:p>
             <a:fld id="{7ECA231E-A98D-4CFD-BF7B-F211F4ADBCDA}" type="datetimeFigureOut">
               <a:rPr lang="en-US" smtClean="0"/>
-              <a:t>9/19/2017</a:t>
+              <a:t>11/3/2017</a:t>
             </a:fld>
             <a:endParaRPr lang="en-US"/>
           </a:p>
@@ -1010,7 +1010,7 @@
           <a:p>
             <a:fld id="{7ECA231E-A98D-4CFD-BF7B-F211F4ADBCDA}" type="datetimeFigureOut">
               <a:rPr lang="en-US" smtClean="0"/>
-              <a:t>9/19/2017</a:t>
+              <a:t>11/3/2017</a:t>
             </a:fld>
             <a:endParaRPr lang="en-US"/>
           </a:p>
@@ -1242,7 +1242,7 @@
           <a:p>
             <a:fld id="{7ECA231E-A98D-4CFD-BF7B-F211F4ADBCDA}" type="datetimeFigureOut">
               <a:rPr lang="en-US" smtClean="0"/>
-              <a:t>9/19/2017</a:t>
+              <a:t>11/3/2017</a:t>
             </a:fld>
             <a:endParaRPr lang="en-US"/>
           </a:p>
@@ -1609,7 +1609,7 @@
           <a:p>
             <a:fld id="{7ECA231E-A98D-4CFD-BF7B-F211F4ADBCDA}" type="datetimeFigureOut">
               <a:rPr lang="en-US" smtClean="0"/>
-              <a:t>9/19/2017</a:t>
+              <a:t>11/3/2017</a:t>
             </a:fld>
             <a:endParaRPr lang="en-US"/>
           </a:p>
@@ -1727,7 +1727,7 @@
           <a:p>
             <a:fld id="{7ECA231E-A98D-4CFD-BF7B-F211F4ADBCDA}" type="datetimeFigureOut">
               <a:rPr lang="en-US" smtClean="0"/>
-              <a:t>9/19/2017</a:t>
+              <a:t>11/3/2017</a:t>
             </a:fld>
             <a:endParaRPr lang="en-US"/>
           </a:p>
@@ -1822,7 +1822,7 @@
           <a:p>
             <a:fld id="{7ECA231E-A98D-4CFD-BF7B-F211F4ADBCDA}" type="datetimeFigureOut">
               <a:rPr lang="en-US" smtClean="0"/>
-              <a:t>9/19/2017</a:t>
+              <a:t>11/3/2017</a:t>
             </a:fld>
             <a:endParaRPr lang="en-US"/>
           </a:p>
@@ -2099,7 +2099,7 @@
           <a:p>
             <a:fld id="{7ECA231E-A98D-4CFD-BF7B-F211F4ADBCDA}" type="datetimeFigureOut">
               <a:rPr lang="en-US" smtClean="0"/>
-              <a:t>9/19/2017</a:t>
+              <a:t>11/3/2017</a:t>
             </a:fld>
             <a:endParaRPr lang="en-US"/>
           </a:p>
@@ -2352,7 +2352,7 @@
           <a:p>
             <a:fld id="{7ECA231E-A98D-4CFD-BF7B-F211F4ADBCDA}" type="datetimeFigureOut">
               <a:rPr lang="en-US" smtClean="0"/>
-              <a:t>9/19/2017</a:t>
+              <a:t>11/3/2017</a:t>
             </a:fld>
             <a:endParaRPr lang="en-US"/>
           </a:p>
@@ -2565,7 +2565,7 @@
           <a:p>
             <a:fld id="{7ECA231E-A98D-4CFD-BF7B-F211F4ADBCDA}" type="datetimeFigureOut">
               <a:rPr lang="en-US" smtClean="0"/>
-              <a:t>9/19/2017</a:t>
+              <a:t>11/3/2017</a:t>
             </a:fld>
             <a:endParaRPr lang="en-US"/>
           </a:p>
@@ -3551,8 +3551,8 @@
         </p:nvSpPr>
         <p:spPr>
           <a:xfrm>
-            <a:off x="832130" y="4982175"/>
-            <a:ext cx="7457798" cy="1200329"/>
+            <a:off x="832130" y="4889841"/>
+            <a:ext cx="7457798" cy="1384995"/>
           </a:xfrm>
           <a:prstGeom prst="rect">
             <a:avLst/>
@@ -3565,6 +3565,18 @@
           </a:bodyPr>
           <a:lstStyle/>
           <a:p>
+            <a:r>
+              <a:rPr lang="en-US" sz="1200" dirty="0">
+                <a:solidFill>
+                  <a:schemeClr val="bg1">
+                    <a:lumMod val="95000"/>
+                  </a:schemeClr>
+                </a:solidFill>
+                <a:latin typeface="Arial" panose="020B0604020202020204" pitchFamily="34" charset="0"/>
+                <a:cs typeface="Arial" panose="020B0604020202020204" pitchFamily="34" charset="0"/>
+              </a:rPr>
+              <a:t>This software has been approved for release by the U.S. Geological </a:t>
+            </a:r>
             <a:r>
               <a:rPr lang="en-US" sz="1200" dirty="0" smtClean="0">
                 <a:solidFill>
@@ -3575,7 +3587,225 @@
                 <a:latin typeface="Arial" panose="020B0604020202020204" pitchFamily="34" charset="0"/>
                 <a:cs typeface="Arial" panose="020B0604020202020204" pitchFamily="34" charset="0"/>
               </a:rPr>
-              <a:t>This software is preliminary or provisional and is subject to revision. It is being provided to meet the need for timely best science. The software has not received final approval by the U.S. Geological Survey (USGS). No warranty, expressed or implied, is made by the USGS or the U.S. Government as to the functionality of the software and related material nor shall the fact of release constitute any such warranty. The software is provided on the condition that neither the USGS nor the U.S. Government shall be held liable for any damages resulting from the authorized or unauthorized use of the software.</a:t>
+              <a:t>Survey (USGS</a:t>
+            </a:r>
+            <a:r>
+              <a:rPr lang="en-US" sz="1200" dirty="0">
+                <a:solidFill>
+                  <a:schemeClr val="bg1">
+                    <a:lumMod val="95000"/>
+                  </a:schemeClr>
+                </a:solidFill>
+                <a:latin typeface="Arial" panose="020B0604020202020204" pitchFamily="34" charset="0"/>
+                <a:cs typeface="Arial" panose="020B0604020202020204" pitchFamily="34" charset="0"/>
+              </a:rPr>
+              <a:t>). Although the software has been subjected to rigorous review, the </a:t>
+            </a:r>
+            <a:r>
+              <a:rPr lang="en-US" sz="1200" dirty="0" smtClean="0">
+                <a:solidFill>
+                  <a:schemeClr val="bg1">
+                    <a:lumMod val="95000"/>
+                  </a:schemeClr>
+                </a:solidFill>
+                <a:latin typeface="Arial" panose="020B0604020202020204" pitchFamily="34" charset="0"/>
+                <a:cs typeface="Arial" panose="020B0604020202020204" pitchFamily="34" charset="0"/>
+              </a:rPr>
+              <a:t>USGS reserves </a:t>
+            </a:r>
+            <a:r>
+              <a:rPr lang="en-US" sz="1200" dirty="0">
+                <a:solidFill>
+                  <a:schemeClr val="bg1">
+                    <a:lumMod val="95000"/>
+                  </a:schemeClr>
+                </a:solidFill>
+                <a:latin typeface="Arial" panose="020B0604020202020204" pitchFamily="34" charset="0"/>
+                <a:cs typeface="Arial" panose="020B0604020202020204" pitchFamily="34" charset="0"/>
+              </a:rPr>
+              <a:t>the right to update the software as </a:t>
+            </a:r>
+            <a:r>
+              <a:rPr lang="en-US" sz="1200" dirty="0" smtClean="0">
+                <a:solidFill>
+                  <a:schemeClr val="bg1">
+                    <a:lumMod val="95000"/>
+                  </a:schemeClr>
+                </a:solidFill>
+                <a:latin typeface="Arial" panose="020B0604020202020204" pitchFamily="34" charset="0"/>
+                <a:cs typeface="Arial" panose="020B0604020202020204" pitchFamily="34" charset="0"/>
+              </a:rPr>
+              <a:t>needed pursuant </a:t>
+            </a:r>
+            <a:r>
+              <a:rPr lang="en-US" sz="1200" dirty="0">
+                <a:solidFill>
+                  <a:schemeClr val="bg1">
+                    <a:lumMod val="95000"/>
+                  </a:schemeClr>
+                </a:solidFill>
+                <a:latin typeface="Arial" panose="020B0604020202020204" pitchFamily="34" charset="0"/>
+                <a:cs typeface="Arial" panose="020B0604020202020204" pitchFamily="34" charset="0"/>
+              </a:rPr>
+              <a:t>to further </a:t>
+            </a:r>
+            <a:r>
+              <a:rPr lang="en-US" sz="1200" dirty="0" smtClean="0">
+                <a:solidFill>
+                  <a:schemeClr val="bg1">
+                    <a:lumMod val="95000"/>
+                  </a:schemeClr>
+                </a:solidFill>
+                <a:latin typeface="Arial" panose="020B0604020202020204" pitchFamily="34" charset="0"/>
+                <a:cs typeface="Arial" panose="020B0604020202020204" pitchFamily="34" charset="0"/>
+              </a:rPr>
+              <a:t>analysis and </a:t>
+            </a:r>
+            <a:r>
+              <a:rPr lang="en-US" sz="1200" dirty="0">
+                <a:solidFill>
+                  <a:schemeClr val="bg1">
+                    <a:lumMod val="95000"/>
+                  </a:schemeClr>
+                </a:solidFill>
+                <a:latin typeface="Arial" panose="020B0604020202020204" pitchFamily="34" charset="0"/>
+                <a:cs typeface="Arial" panose="020B0604020202020204" pitchFamily="34" charset="0"/>
+              </a:rPr>
+              <a:t>review. No warranty, expressed or implied, is made by the USGS or the </a:t>
+            </a:r>
+            <a:r>
+              <a:rPr lang="en-US" sz="1200" dirty="0" smtClean="0">
+                <a:solidFill>
+                  <a:schemeClr val="bg1">
+                    <a:lumMod val="95000"/>
+                  </a:schemeClr>
+                </a:solidFill>
+                <a:latin typeface="Arial" panose="020B0604020202020204" pitchFamily="34" charset="0"/>
+                <a:cs typeface="Arial" panose="020B0604020202020204" pitchFamily="34" charset="0"/>
+              </a:rPr>
+              <a:t>U.S. Government </a:t>
+            </a:r>
+            <a:r>
+              <a:rPr lang="en-US" sz="1200" dirty="0">
+                <a:solidFill>
+                  <a:schemeClr val="bg1">
+                    <a:lumMod val="95000"/>
+                  </a:schemeClr>
+                </a:solidFill>
+                <a:latin typeface="Arial" panose="020B0604020202020204" pitchFamily="34" charset="0"/>
+                <a:cs typeface="Arial" panose="020B0604020202020204" pitchFamily="34" charset="0"/>
+              </a:rPr>
+              <a:t>as to the functionality of the software and related material </a:t>
+            </a:r>
+            <a:r>
+              <a:rPr lang="en-US" sz="1200" dirty="0" smtClean="0">
+                <a:solidFill>
+                  <a:schemeClr val="bg1">
+                    <a:lumMod val="95000"/>
+                  </a:schemeClr>
+                </a:solidFill>
+                <a:latin typeface="Arial" panose="020B0604020202020204" pitchFamily="34" charset="0"/>
+                <a:cs typeface="Arial" panose="020B0604020202020204" pitchFamily="34" charset="0"/>
+              </a:rPr>
+              <a:t>nor shall </a:t>
+            </a:r>
+            <a:r>
+              <a:rPr lang="en-US" sz="1200" dirty="0">
+                <a:solidFill>
+                  <a:schemeClr val="bg1">
+                    <a:lumMod val="95000"/>
+                  </a:schemeClr>
+                </a:solidFill>
+                <a:latin typeface="Arial" panose="020B0604020202020204" pitchFamily="34" charset="0"/>
+                <a:cs typeface="Arial" panose="020B0604020202020204" pitchFamily="34" charset="0"/>
+              </a:rPr>
+              <a:t>the fact of </a:t>
+            </a:r>
+            <a:r>
+              <a:rPr lang="en-US" sz="1200" dirty="0" smtClean="0">
+                <a:solidFill>
+                  <a:schemeClr val="bg1">
+                    <a:lumMod val="95000"/>
+                  </a:schemeClr>
+                </a:solidFill>
+                <a:latin typeface="Arial" panose="020B0604020202020204" pitchFamily="34" charset="0"/>
+                <a:cs typeface="Arial" panose="020B0604020202020204" pitchFamily="34" charset="0"/>
+              </a:rPr>
+              <a:t>release constitute </a:t>
+            </a:r>
+            <a:r>
+              <a:rPr lang="en-US" sz="1200" dirty="0">
+                <a:solidFill>
+                  <a:schemeClr val="bg1">
+                    <a:lumMod val="95000"/>
+                  </a:schemeClr>
+                </a:solidFill>
+                <a:latin typeface="Arial" panose="020B0604020202020204" pitchFamily="34" charset="0"/>
+                <a:cs typeface="Arial" panose="020B0604020202020204" pitchFamily="34" charset="0"/>
+              </a:rPr>
+              <a:t>any such warranty. Furthermore, </a:t>
+            </a:r>
+            <a:r>
+              <a:rPr lang="en-US" sz="1200" dirty="0" smtClean="0">
+                <a:solidFill>
+                  <a:schemeClr val="bg1">
+                    <a:lumMod val="95000"/>
+                  </a:schemeClr>
+                </a:solidFill>
+                <a:latin typeface="Arial" panose="020B0604020202020204" pitchFamily="34" charset="0"/>
+                <a:cs typeface="Arial" panose="020B0604020202020204" pitchFamily="34" charset="0"/>
+              </a:rPr>
+              <a:t>the software </a:t>
+            </a:r>
+            <a:r>
+              <a:rPr lang="en-US" sz="1200" dirty="0">
+                <a:solidFill>
+                  <a:schemeClr val="bg1">
+                    <a:lumMod val="95000"/>
+                  </a:schemeClr>
+                </a:solidFill>
+                <a:latin typeface="Arial" panose="020B0604020202020204" pitchFamily="34" charset="0"/>
+                <a:cs typeface="Arial" panose="020B0604020202020204" pitchFamily="34" charset="0"/>
+              </a:rPr>
+              <a:t>is released on condition that neither the USGS nor the U.S. </a:t>
+            </a:r>
+            <a:r>
+              <a:rPr lang="en-US" sz="1200" dirty="0" smtClean="0">
+                <a:solidFill>
+                  <a:schemeClr val="bg1">
+                    <a:lumMod val="95000"/>
+                  </a:schemeClr>
+                </a:solidFill>
+                <a:latin typeface="Arial" panose="020B0604020202020204" pitchFamily="34" charset="0"/>
+                <a:cs typeface="Arial" panose="020B0604020202020204" pitchFamily="34" charset="0"/>
+              </a:rPr>
+              <a:t>Government shall </a:t>
+            </a:r>
+            <a:r>
+              <a:rPr lang="en-US" sz="1200" dirty="0">
+                <a:solidFill>
+                  <a:schemeClr val="bg1">
+                    <a:lumMod val="95000"/>
+                  </a:schemeClr>
+                </a:solidFill>
+                <a:latin typeface="Arial" panose="020B0604020202020204" pitchFamily="34" charset="0"/>
+                <a:cs typeface="Arial" panose="020B0604020202020204" pitchFamily="34" charset="0"/>
+              </a:rPr>
+              <a:t>be held liable for any damages resulting from its authorized or</a:t>
+            </a:r>
+          </a:p>
+          <a:p>
+            <a:r>
+              <a:rPr lang="en-US" sz="1200" dirty="0">
+                <a:solidFill>
+                  <a:schemeClr val="bg1">
+                    <a:lumMod val="95000"/>
+                  </a:schemeClr>
+                </a:solidFill>
+                <a:latin typeface="Arial" panose="020B0604020202020204" pitchFamily="34" charset="0"/>
+                <a:cs typeface="Arial" panose="020B0604020202020204" pitchFamily="34" charset="0"/>
+              </a:rPr>
+              <a:t>unauthorized use.</a:t>
             </a:r>
             <a:endParaRPr lang="en-US" sz="1200" dirty="0">
               <a:solidFill>

</xml_diff>

<commit_message>
Final release review reconciliation
</commit_message>
<xml_diff>
--- a/pymdwizard/resources/icons/SplashScreenGeneration.pptx
+++ b/pymdwizard/resources/icons/SplashScreenGeneration.pptx
@@ -244,7 +244,7 @@
           <a:p>
             <a:fld id="{7ECA231E-A98D-4CFD-BF7B-F211F4ADBCDA}" type="datetimeFigureOut">
               <a:rPr lang="en-US" smtClean="0"/>
-              <a:t>9/19/2017</a:t>
+              <a:t>11/3/2017</a:t>
             </a:fld>
             <a:endParaRPr lang="en-US"/>
           </a:p>
@@ -414,7 +414,7 @@
           <a:p>
             <a:fld id="{7ECA231E-A98D-4CFD-BF7B-F211F4ADBCDA}" type="datetimeFigureOut">
               <a:rPr lang="en-US" smtClean="0"/>
-              <a:t>9/19/2017</a:t>
+              <a:t>11/3/2017</a:t>
             </a:fld>
             <a:endParaRPr lang="en-US"/>
           </a:p>
@@ -594,7 +594,7 @@
           <a:p>
             <a:fld id="{7ECA231E-A98D-4CFD-BF7B-F211F4ADBCDA}" type="datetimeFigureOut">
               <a:rPr lang="en-US" smtClean="0"/>
-              <a:t>9/19/2017</a:t>
+              <a:t>11/3/2017</a:t>
             </a:fld>
             <a:endParaRPr lang="en-US"/>
           </a:p>
@@ -764,7 +764,7 @@
           <a:p>
             <a:fld id="{7ECA231E-A98D-4CFD-BF7B-F211F4ADBCDA}" type="datetimeFigureOut">
               <a:rPr lang="en-US" smtClean="0"/>
-              <a:t>9/19/2017</a:t>
+              <a:t>11/3/2017</a:t>
             </a:fld>
             <a:endParaRPr lang="en-US"/>
           </a:p>
@@ -1010,7 +1010,7 @@
           <a:p>
             <a:fld id="{7ECA231E-A98D-4CFD-BF7B-F211F4ADBCDA}" type="datetimeFigureOut">
               <a:rPr lang="en-US" smtClean="0"/>
-              <a:t>9/19/2017</a:t>
+              <a:t>11/3/2017</a:t>
             </a:fld>
             <a:endParaRPr lang="en-US"/>
           </a:p>
@@ -1242,7 +1242,7 @@
           <a:p>
             <a:fld id="{7ECA231E-A98D-4CFD-BF7B-F211F4ADBCDA}" type="datetimeFigureOut">
               <a:rPr lang="en-US" smtClean="0"/>
-              <a:t>9/19/2017</a:t>
+              <a:t>11/3/2017</a:t>
             </a:fld>
             <a:endParaRPr lang="en-US"/>
           </a:p>
@@ -1609,7 +1609,7 @@
           <a:p>
             <a:fld id="{7ECA231E-A98D-4CFD-BF7B-F211F4ADBCDA}" type="datetimeFigureOut">
               <a:rPr lang="en-US" smtClean="0"/>
-              <a:t>9/19/2017</a:t>
+              <a:t>11/3/2017</a:t>
             </a:fld>
             <a:endParaRPr lang="en-US"/>
           </a:p>
@@ -1727,7 +1727,7 @@
           <a:p>
             <a:fld id="{7ECA231E-A98D-4CFD-BF7B-F211F4ADBCDA}" type="datetimeFigureOut">
               <a:rPr lang="en-US" smtClean="0"/>
-              <a:t>9/19/2017</a:t>
+              <a:t>11/3/2017</a:t>
             </a:fld>
             <a:endParaRPr lang="en-US"/>
           </a:p>
@@ -1822,7 +1822,7 @@
           <a:p>
             <a:fld id="{7ECA231E-A98D-4CFD-BF7B-F211F4ADBCDA}" type="datetimeFigureOut">
               <a:rPr lang="en-US" smtClean="0"/>
-              <a:t>9/19/2017</a:t>
+              <a:t>11/3/2017</a:t>
             </a:fld>
             <a:endParaRPr lang="en-US"/>
           </a:p>
@@ -2099,7 +2099,7 @@
           <a:p>
             <a:fld id="{7ECA231E-A98D-4CFD-BF7B-F211F4ADBCDA}" type="datetimeFigureOut">
               <a:rPr lang="en-US" smtClean="0"/>
-              <a:t>9/19/2017</a:t>
+              <a:t>11/3/2017</a:t>
             </a:fld>
             <a:endParaRPr lang="en-US"/>
           </a:p>
@@ -2352,7 +2352,7 @@
           <a:p>
             <a:fld id="{7ECA231E-A98D-4CFD-BF7B-F211F4ADBCDA}" type="datetimeFigureOut">
               <a:rPr lang="en-US" smtClean="0"/>
-              <a:t>9/19/2017</a:t>
+              <a:t>11/3/2017</a:t>
             </a:fld>
             <a:endParaRPr lang="en-US"/>
           </a:p>
@@ -2565,7 +2565,7 @@
           <a:p>
             <a:fld id="{7ECA231E-A98D-4CFD-BF7B-F211F4ADBCDA}" type="datetimeFigureOut">
               <a:rPr lang="en-US" smtClean="0"/>
-              <a:t>9/19/2017</a:t>
+              <a:t>11/3/2017</a:t>
             </a:fld>
             <a:endParaRPr lang="en-US"/>
           </a:p>
@@ -3551,8 +3551,8 @@
         </p:nvSpPr>
         <p:spPr>
           <a:xfrm>
-            <a:off x="832130" y="4982175"/>
-            <a:ext cx="7457798" cy="1200329"/>
+            <a:off x="832130" y="4889841"/>
+            <a:ext cx="7457798" cy="1384995"/>
           </a:xfrm>
           <a:prstGeom prst="rect">
             <a:avLst/>
@@ -3565,6 +3565,18 @@
           </a:bodyPr>
           <a:lstStyle/>
           <a:p>
+            <a:r>
+              <a:rPr lang="en-US" sz="1200" dirty="0">
+                <a:solidFill>
+                  <a:schemeClr val="bg1">
+                    <a:lumMod val="95000"/>
+                  </a:schemeClr>
+                </a:solidFill>
+                <a:latin typeface="Arial" panose="020B0604020202020204" pitchFamily="34" charset="0"/>
+                <a:cs typeface="Arial" panose="020B0604020202020204" pitchFamily="34" charset="0"/>
+              </a:rPr>
+              <a:t>This software has been approved for release by the U.S. Geological </a:t>
+            </a:r>
             <a:r>
               <a:rPr lang="en-US" sz="1200" dirty="0" smtClean="0">
                 <a:solidFill>
@@ -3575,7 +3587,225 @@
                 <a:latin typeface="Arial" panose="020B0604020202020204" pitchFamily="34" charset="0"/>
                 <a:cs typeface="Arial" panose="020B0604020202020204" pitchFamily="34" charset="0"/>
               </a:rPr>
-              <a:t>This software is preliminary or provisional and is subject to revision. It is being provided to meet the need for timely best science. The software has not received final approval by the U.S. Geological Survey (USGS). No warranty, expressed or implied, is made by the USGS or the U.S. Government as to the functionality of the software and related material nor shall the fact of release constitute any such warranty. The software is provided on the condition that neither the USGS nor the U.S. Government shall be held liable for any damages resulting from the authorized or unauthorized use of the software.</a:t>
+              <a:t>Survey (USGS</a:t>
+            </a:r>
+            <a:r>
+              <a:rPr lang="en-US" sz="1200" dirty="0">
+                <a:solidFill>
+                  <a:schemeClr val="bg1">
+                    <a:lumMod val="95000"/>
+                  </a:schemeClr>
+                </a:solidFill>
+                <a:latin typeface="Arial" panose="020B0604020202020204" pitchFamily="34" charset="0"/>
+                <a:cs typeface="Arial" panose="020B0604020202020204" pitchFamily="34" charset="0"/>
+              </a:rPr>
+              <a:t>). Although the software has been subjected to rigorous review, the </a:t>
+            </a:r>
+            <a:r>
+              <a:rPr lang="en-US" sz="1200" dirty="0" smtClean="0">
+                <a:solidFill>
+                  <a:schemeClr val="bg1">
+                    <a:lumMod val="95000"/>
+                  </a:schemeClr>
+                </a:solidFill>
+                <a:latin typeface="Arial" panose="020B0604020202020204" pitchFamily="34" charset="0"/>
+                <a:cs typeface="Arial" panose="020B0604020202020204" pitchFamily="34" charset="0"/>
+              </a:rPr>
+              <a:t>USGS reserves </a:t>
+            </a:r>
+            <a:r>
+              <a:rPr lang="en-US" sz="1200" dirty="0">
+                <a:solidFill>
+                  <a:schemeClr val="bg1">
+                    <a:lumMod val="95000"/>
+                  </a:schemeClr>
+                </a:solidFill>
+                <a:latin typeface="Arial" panose="020B0604020202020204" pitchFamily="34" charset="0"/>
+                <a:cs typeface="Arial" panose="020B0604020202020204" pitchFamily="34" charset="0"/>
+              </a:rPr>
+              <a:t>the right to update the software as </a:t>
+            </a:r>
+            <a:r>
+              <a:rPr lang="en-US" sz="1200" dirty="0" smtClean="0">
+                <a:solidFill>
+                  <a:schemeClr val="bg1">
+                    <a:lumMod val="95000"/>
+                  </a:schemeClr>
+                </a:solidFill>
+                <a:latin typeface="Arial" panose="020B0604020202020204" pitchFamily="34" charset="0"/>
+                <a:cs typeface="Arial" panose="020B0604020202020204" pitchFamily="34" charset="0"/>
+              </a:rPr>
+              <a:t>needed pursuant </a:t>
+            </a:r>
+            <a:r>
+              <a:rPr lang="en-US" sz="1200" dirty="0">
+                <a:solidFill>
+                  <a:schemeClr val="bg1">
+                    <a:lumMod val="95000"/>
+                  </a:schemeClr>
+                </a:solidFill>
+                <a:latin typeface="Arial" panose="020B0604020202020204" pitchFamily="34" charset="0"/>
+                <a:cs typeface="Arial" panose="020B0604020202020204" pitchFamily="34" charset="0"/>
+              </a:rPr>
+              <a:t>to further </a:t>
+            </a:r>
+            <a:r>
+              <a:rPr lang="en-US" sz="1200" dirty="0" smtClean="0">
+                <a:solidFill>
+                  <a:schemeClr val="bg1">
+                    <a:lumMod val="95000"/>
+                  </a:schemeClr>
+                </a:solidFill>
+                <a:latin typeface="Arial" panose="020B0604020202020204" pitchFamily="34" charset="0"/>
+                <a:cs typeface="Arial" panose="020B0604020202020204" pitchFamily="34" charset="0"/>
+              </a:rPr>
+              <a:t>analysis and </a:t>
+            </a:r>
+            <a:r>
+              <a:rPr lang="en-US" sz="1200" dirty="0">
+                <a:solidFill>
+                  <a:schemeClr val="bg1">
+                    <a:lumMod val="95000"/>
+                  </a:schemeClr>
+                </a:solidFill>
+                <a:latin typeface="Arial" panose="020B0604020202020204" pitchFamily="34" charset="0"/>
+                <a:cs typeface="Arial" panose="020B0604020202020204" pitchFamily="34" charset="0"/>
+              </a:rPr>
+              <a:t>review. No warranty, expressed or implied, is made by the USGS or the </a:t>
+            </a:r>
+            <a:r>
+              <a:rPr lang="en-US" sz="1200" dirty="0" smtClean="0">
+                <a:solidFill>
+                  <a:schemeClr val="bg1">
+                    <a:lumMod val="95000"/>
+                  </a:schemeClr>
+                </a:solidFill>
+                <a:latin typeface="Arial" panose="020B0604020202020204" pitchFamily="34" charset="0"/>
+                <a:cs typeface="Arial" panose="020B0604020202020204" pitchFamily="34" charset="0"/>
+              </a:rPr>
+              <a:t>U.S. Government </a:t>
+            </a:r>
+            <a:r>
+              <a:rPr lang="en-US" sz="1200" dirty="0">
+                <a:solidFill>
+                  <a:schemeClr val="bg1">
+                    <a:lumMod val="95000"/>
+                  </a:schemeClr>
+                </a:solidFill>
+                <a:latin typeface="Arial" panose="020B0604020202020204" pitchFamily="34" charset="0"/>
+                <a:cs typeface="Arial" panose="020B0604020202020204" pitchFamily="34" charset="0"/>
+              </a:rPr>
+              <a:t>as to the functionality of the software and related material </a:t>
+            </a:r>
+            <a:r>
+              <a:rPr lang="en-US" sz="1200" dirty="0" smtClean="0">
+                <a:solidFill>
+                  <a:schemeClr val="bg1">
+                    <a:lumMod val="95000"/>
+                  </a:schemeClr>
+                </a:solidFill>
+                <a:latin typeface="Arial" panose="020B0604020202020204" pitchFamily="34" charset="0"/>
+                <a:cs typeface="Arial" panose="020B0604020202020204" pitchFamily="34" charset="0"/>
+              </a:rPr>
+              <a:t>nor shall </a:t>
+            </a:r>
+            <a:r>
+              <a:rPr lang="en-US" sz="1200" dirty="0">
+                <a:solidFill>
+                  <a:schemeClr val="bg1">
+                    <a:lumMod val="95000"/>
+                  </a:schemeClr>
+                </a:solidFill>
+                <a:latin typeface="Arial" panose="020B0604020202020204" pitchFamily="34" charset="0"/>
+                <a:cs typeface="Arial" panose="020B0604020202020204" pitchFamily="34" charset="0"/>
+              </a:rPr>
+              <a:t>the fact of </a:t>
+            </a:r>
+            <a:r>
+              <a:rPr lang="en-US" sz="1200" dirty="0" smtClean="0">
+                <a:solidFill>
+                  <a:schemeClr val="bg1">
+                    <a:lumMod val="95000"/>
+                  </a:schemeClr>
+                </a:solidFill>
+                <a:latin typeface="Arial" panose="020B0604020202020204" pitchFamily="34" charset="0"/>
+                <a:cs typeface="Arial" panose="020B0604020202020204" pitchFamily="34" charset="0"/>
+              </a:rPr>
+              <a:t>release constitute </a:t>
+            </a:r>
+            <a:r>
+              <a:rPr lang="en-US" sz="1200" dirty="0">
+                <a:solidFill>
+                  <a:schemeClr val="bg1">
+                    <a:lumMod val="95000"/>
+                  </a:schemeClr>
+                </a:solidFill>
+                <a:latin typeface="Arial" panose="020B0604020202020204" pitchFamily="34" charset="0"/>
+                <a:cs typeface="Arial" panose="020B0604020202020204" pitchFamily="34" charset="0"/>
+              </a:rPr>
+              <a:t>any such warranty. Furthermore, </a:t>
+            </a:r>
+            <a:r>
+              <a:rPr lang="en-US" sz="1200" dirty="0" smtClean="0">
+                <a:solidFill>
+                  <a:schemeClr val="bg1">
+                    <a:lumMod val="95000"/>
+                  </a:schemeClr>
+                </a:solidFill>
+                <a:latin typeface="Arial" panose="020B0604020202020204" pitchFamily="34" charset="0"/>
+                <a:cs typeface="Arial" panose="020B0604020202020204" pitchFamily="34" charset="0"/>
+              </a:rPr>
+              <a:t>the software </a:t>
+            </a:r>
+            <a:r>
+              <a:rPr lang="en-US" sz="1200" dirty="0">
+                <a:solidFill>
+                  <a:schemeClr val="bg1">
+                    <a:lumMod val="95000"/>
+                  </a:schemeClr>
+                </a:solidFill>
+                <a:latin typeface="Arial" panose="020B0604020202020204" pitchFamily="34" charset="0"/>
+                <a:cs typeface="Arial" panose="020B0604020202020204" pitchFamily="34" charset="0"/>
+              </a:rPr>
+              <a:t>is released on condition that neither the USGS nor the U.S. </a:t>
+            </a:r>
+            <a:r>
+              <a:rPr lang="en-US" sz="1200" dirty="0" smtClean="0">
+                <a:solidFill>
+                  <a:schemeClr val="bg1">
+                    <a:lumMod val="95000"/>
+                  </a:schemeClr>
+                </a:solidFill>
+                <a:latin typeface="Arial" panose="020B0604020202020204" pitchFamily="34" charset="0"/>
+                <a:cs typeface="Arial" panose="020B0604020202020204" pitchFamily="34" charset="0"/>
+              </a:rPr>
+              <a:t>Government shall </a:t>
+            </a:r>
+            <a:r>
+              <a:rPr lang="en-US" sz="1200" dirty="0">
+                <a:solidFill>
+                  <a:schemeClr val="bg1">
+                    <a:lumMod val="95000"/>
+                  </a:schemeClr>
+                </a:solidFill>
+                <a:latin typeface="Arial" panose="020B0604020202020204" pitchFamily="34" charset="0"/>
+                <a:cs typeface="Arial" panose="020B0604020202020204" pitchFamily="34" charset="0"/>
+              </a:rPr>
+              <a:t>be held liable for any damages resulting from its authorized or</a:t>
+            </a:r>
+          </a:p>
+          <a:p>
+            <a:r>
+              <a:rPr lang="en-US" sz="1200" dirty="0">
+                <a:solidFill>
+                  <a:schemeClr val="bg1">
+                    <a:lumMod val="95000"/>
+                  </a:schemeClr>
+                </a:solidFill>
+                <a:latin typeface="Arial" panose="020B0604020202020204" pitchFamily="34" charset="0"/>
+                <a:cs typeface="Arial" panose="020B0604020202020204" pitchFamily="34" charset="0"/>
+              </a:rPr>
+              <a:t>unauthorized use.</a:t>
             </a:r>
             <a:endParaRPr lang="en-US" sz="1200" dirty="0">
               <a:solidFill>

</xml_diff>

<commit_message>
incremente version number to 2.0.1
</commit_message>
<xml_diff>
--- a/pymdwizard/resources/icons/SplashScreenGeneration.pptx
+++ b/pymdwizard/resources/icons/SplashScreenGeneration.pptx
@@ -244,7 +244,7 @@
           <a:p>
             <a:fld id="{7ECA231E-A98D-4CFD-BF7B-F211F4ADBCDA}" type="datetimeFigureOut">
               <a:rPr lang="en-US" smtClean="0"/>
-              <a:t>11/3/2017</a:t>
+              <a:t>11/16/2017</a:t>
             </a:fld>
             <a:endParaRPr lang="en-US"/>
           </a:p>
@@ -414,7 +414,7 @@
           <a:p>
             <a:fld id="{7ECA231E-A98D-4CFD-BF7B-F211F4ADBCDA}" type="datetimeFigureOut">
               <a:rPr lang="en-US" smtClean="0"/>
-              <a:t>11/3/2017</a:t>
+              <a:t>11/16/2017</a:t>
             </a:fld>
             <a:endParaRPr lang="en-US"/>
           </a:p>
@@ -594,7 +594,7 @@
           <a:p>
             <a:fld id="{7ECA231E-A98D-4CFD-BF7B-F211F4ADBCDA}" type="datetimeFigureOut">
               <a:rPr lang="en-US" smtClean="0"/>
-              <a:t>11/3/2017</a:t>
+              <a:t>11/16/2017</a:t>
             </a:fld>
             <a:endParaRPr lang="en-US"/>
           </a:p>
@@ -764,7 +764,7 @@
           <a:p>
             <a:fld id="{7ECA231E-A98D-4CFD-BF7B-F211F4ADBCDA}" type="datetimeFigureOut">
               <a:rPr lang="en-US" smtClean="0"/>
-              <a:t>11/3/2017</a:t>
+              <a:t>11/16/2017</a:t>
             </a:fld>
             <a:endParaRPr lang="en-US"/>
           </a:p>
@@ -1010,7 +1010,7 @@
           <a:p>
             <a:fld id="{7ECA231E-A98D-4CFD-BF7B-F211F4ADBCDA}" type="datetimeFigureOut">
               <a:rPr lang="en-US" smtClean="0"/>
-              <a:t>11/3/2017</a:t>
+              <a:t>11/16/2017</a:t>
             </a:fld>
             <a:endParaRPr lang="en-US"/>
           </a:p>
@@ -1242,7 +1242,7 @@
           <a:p>
             <a:fld id="{7ECA231E-A98D-4CFD-BF7B-F211F4ADBCDA}" type="datetimeFigureOut">
               <a:rPr lang="en-US" smtClean="0"/>
-              <a:t>11/3/2017</a:t>
+              <a:t>11/16/2017</a:t>
             </a:fld>
             <a:endParaRPr lang="en-US"/>
           </a:p>
@@ -1609,7 +1609,7 @@
           <a:p>
             <a:fld id="{7ECA231E-A98D-4CFD-BF7B-F211F4ADBCDA}" type="datetimeFigureOut">
               <a:rPr lang="en-US" smtClean="0"/>
-              <a:t>11/3/2017</a:t>
+              <a:t>11/16/2017</a:t>
             </a:fld>
             <a:endParaRPr lang="en-US"/>
           </a:p>
@@ -1727,7 +1727,7 @@
           <a:p>
             <a:fld id="{7ECA231E-A98D-4CFD-BF7B-F211F4ADBCDA}" type="datetimeFigureOut">
               <a:rPr lang="en-US" smtClean="0"/>
-              <a:t>11/3/2017</a:t>
+              <a:t>11/16/2017</a:t>
             </a:fld>
             <a:endParaRPr lang="en-US"/>
           </a:p>
@@ -1822,7 +1822,7 @@
           <a:p>
             <a:fld id="{7ECA231E-A98D-4CFD-BF7B-F211F4ADBCDA}" type="datetimeFigureOut">
               <a:rPr lang="en-US" smtClean="0"/>
-              <a:t>11/3/2017</a:t>
+              <a:t>11/16/2017</a:t>
             </a:fld>
             <a:endParaRPr lang="en-US"/>
           </a:p>
@@ -2099,7 +2099,7 @@
           <a:p>
             <a:fld id="{7ECA231E-A98D-4CFD-BF7B-F211F4ADBCDA}" type="datetimeFigureOut">
               <a:rPr lang="en-US" smtClean="0"/>
-              <a:t>11/3/2017</a:t>
+              <a:t>11/16/2017</a:t>
             </a:fld>
             <a:endParaRPr lang="en-US"/>
           </a:p>
@@ -2352,7 +2352,7 @@
           <a:p>
             <a:fld id="{7ECA231E-A98D-4CFD-BF7B-F211F4ADBCDA}" type="datetimeFigureOut">
               <a:rPr lang="en-US" smtClean="0"/>
-              <a:t>11/3/2017</a:t>
+              <a:t>11/16/2017</a:t>
             </a:fld>
             <a:endParaRPr lang="en-US"/>
           </a:p>
@@ -2565,7 +2565,7 @@
           <a:p>
             <a:fld id="{7ECA231E-A98D-4CFD-BF7B-F211F4ADBCDA}" type="datetimeFigureOut">
               <a:rPr lang="en-US" smtClean="0"/>
-              <a:t>11/3/2017</a:t>
+              <a:t>11/16/2017</a:t>
             </a:fld>
             <a:endParaRPr lang="en-US"/>
           </a:p>
@@ -3523,7 +3523,7 @@
                 </a:effectLst>
                 <a:latin typeface="Arial Black" panose="020B0A04020102020204" pitchFamily="34" charset="0"/>
               </a:rPr>
-              <a:t>2.0.0</a:t>
+              <a:t>2.0.1</a:t>
             </a:r>
             <a:endParaRPr lang="en-US" sz="3200" dirty="0">
               <a:solidFill>
@@ -3807,15 +3807,6 @@
               </a:rPr>
               <a:t>unauthorized use.</a:t>
             </a:r>
-            <a:endParaRPr lang="en-US" sz="1200" dirty="0">
-              <a:solidFill>
-                <a:schemeClr val="bg1">
-                  <a:lumMod val="95000"/>
-                </a:schemeClr>
-              </a:solidFill>
-              <a:latin typeface="Arial" panose="020B0604020202020204" pitchFamily="34" charset="0"/>
-              <a:cs typeface="Arial" panose="020B0604020202020204" pitchFamily="34" charset="0"/>
-            </a:endParaRPr>
           </a:p>
         </p:txBody>
       </p:sp>

</xml_diff>